<commit_message>
Added Course Materials - Day 15
</commit_message>
<xml_diff>
--- a/3. Spring/Day 14/Slides/6. Configuration of Spring and JPA for Development/configuration-of-spring-and-jpa-for-development-slides.pptx
+++ b/3. Spring/Day 14/Slides/6. Configuration of Spring and JPA for Development/configuration-of-spring-and-jpa-for-development-slides.pptx
@@ -5,22 +5,23 @@
     <p:sldMasterId id="2147483648" r:id="rId1"/>
   </p:sldMasterIdLst>
   <p:notesMasterIdLst>
-    <p:notesMasterId r:id="rId16"/>
+    <p:notesMasterId r:id="rId14"/>
   </p:notesMasterIdLst>
+  <p:handoutMasterIdLst>
+    <p:handoutMasterId r:id="rId15"/>
+  </p:handoutMasterIdLst>
   <p:sldIdLst>
     <p:sldId id="256" r:id="rId3"/>
     <p:sldId id="257" r:id="rId4"/>
     <p:sldId id="258" r:id="rId5"/>
-    <p:sldId id="259" r:id="rId6"/>
-    <p:sldId id="260" r:id="rId7"/>
-    <p:sldId id="261" r:id="rId8"/>
-    <p:sldId id="262" r:id="rId9"/>
-    <p:sldId id="263" r:id="rId10"/>
-    <p:sldId id="264" r:id="rId11"/>
-    <p:sldId id="268" r:id="rId12"/>
-    <p:sldId id="265" r:id="rId13"/>
-    <p:sldId id="266" r:id="rId14"/>
-    <p:sldId id="267" r:id="rId15"/>
+    <p:sldId id="261" r:id="rId6"/>
+    <p:sldId id="262" r:id="rId7"/>
+    <p:sldId id="263" r:id="rId8"/>
+    <p:sldId id="264" r:id="rId9"/>
+    <p:sldId id="268" r:id="rId10"/>
+    <p:sldId id="265" r:id="rId11"/>
+    <p:sldId id="266" r:id="rId12"/>
+    <p:sldId id="267" r:id="rId13"/>
   </p:sldIdLst>
   <p:sldSz cx="20104100" cy="11309350"/>
   <p:notesSz cx="20104100" cy="11309350"/>
@@ -117,6 +118,164 @@
     </a:lvl9pPr>
   </p:defaultTextStyle>
 </p:presentation>
+</file>
+
+<file path=ppt/handoutMasters/handoutMaster1.xml><?xml version="1.0" encoding="utf-8"?>
+<p:handoutMaster xmlns:a="http://schemas.openxmlformats.org/drawingml/2006/main" xmlns:r="http://schemas.openxmlformats.org/officeDocument/2006/relationships" xmlns:p="http://schemas.openxmlformats.org/presentationml/2006/main">
+  <p:cSld>
+    <p:bg>
+      <p:bgRef idx="1001">
+        <a:schemeClr val="bg1"/>
+      </p:bgRef>
+    </p:bg>
+    <p:spTree>
+      <p:nvGrpSpPr>
+        <p:cNvPr id="1" name=""/>
+        <p:cNvGrpSpPr/>
+        <p:nvPr/>
+      </p:nvGrpSpPr>
+      <p:grpSpPr>
+        <a:xfrm>
+          <a:off x="0" y="0"/>
+          <a:ext cx="0" cy="0"/>
+          <a:chOff x="0" y="0"/>
+          <a:chExt cx="0" cy="0"/>
+        </a:xfrm>
+      </p:grpSpPr>
+      <p:sp>
+        <p:nvSpPr>
+          <p:cNvPr id="2" name="Header Placeholder 1"/>
+          <p:cNvSpPr>
+            <a:spLocks noGrp="1"/>
+          </p:cNvSpPr>
+          <p:nvPr>
+            <p:ph type="hdr" sz="quarter"/>
+          </p:nvPr>
+        </p:nvSpPr>
+        <p:spPr>
+          <a:xfrm>
+            <a:off x="0" y="0"/>
+            <a:ext cx="8711777" cy="567432"/>
+          </a:xfrm>
+          <a:prstGeom prst="rect">
+            <a:avLst/>
+          </a:prstGeom>
+        </p:spPr>
+        <p:txBody>
+          <a:bodyPr vert="horz" lIns="91440" tIns="45720" rIns="91440" bIns="45720" rtlCol="0"/>
+          <a:lstStyle>
+            <a:lvl1pPr algn="l">
+              <a:defRPr sz="1485"/>
+            </a:lvl1pPr>
+          </a:lstStyle>
+          <a:p>
+            <a:endParaRPr lang="en-US"/>
+          </a:p>
+        </p:txBody>
+      </p:sp>
+      <p:sp>
+        <p:nvSpPr>
+          <p:cNvPr id="3" name="Date Placeholder 2"/>
+          <p:cNvSpPr>
+            <a:spLocks noGrp="1"/>
+          </p:cNvSpPr>
+          <p:nvPr>
+            <p:ph type="dt" sz="quarter" idx="1"/>
+          </p:nvPr>
+        </p:nvSpPr>
+        <p:spPr>
+          <a:xfrm>
+            <a:off x="11387671" y="0"/>
+            <a:ext cx="8711777" cy="567432"/>
+          </a:xfrm>
+          <a:prstGeom prst="rect">
+            <a:avLst/>
+          </a:prstGeom>
+        </p:spPr>
+        <p:txBody>
+          <a:bodyPr vert="horz" lIns="91440" tIns="45720" rIns="91440" bIns="45720" rtlCol="0"/>
+          <a:lstStyle>
+            <a:lvl1pPr algn="r">
+              <a:defRPr sz="1485"/>
+            </a:lvl1pPr>
+          </a:lstStyle>
+          <a:p>
+            <a:fld id="{696C064A-D61B-4B21-B757-51A9B82445B8}" type="datetimeFigureOut">
+              <a:rPr lang="en-US" smtClean="0"/>
+            </a:fld>
+            <a:endParaRPr lang="en-US"/>
+          </a:p>
+        </p:txBody>
+      </p:sp>
+      <p:sp>
+        <p:nvSpPr>
+          <p:cNvPr id="4" name="Footer Placeholder 3"/>
+          <p:cNvSpPr>
+            <a:spLocks noGrp="1"/>
+          </p:cNvSpPr>
+          <p:nvPr>
+            <p:ph type="ftr" sz="quarter" idx="2"/>
+          </p:nvPr>
+        </p:nvSpPr>
+        <p:spPr>
+          <a:xfrm>
+            <a:off x="0" y="10741920"/>
+            <a:ext cx="8711777" cy="567430"/>
+          </a:xfrm>
+          <a:prstGeom prst="rect">
+            <a:avLst/>
+          </a:prstGeom>
+        </p:spPr>
+        <p:txBody>
+          <a:bodyPr vert="horz" lIns="91440" tIns="45720" rIns="91440" bIns="45720" rtlCol="0" anchor="b"/>
+          <a:lstStyle>
+            <a:lvl1pPr algn="l">
+              <a:defRPr sz="1485"/>
+            </a:lvl1pPr>
+          </a:lstStyle>
+          <a:p>
+            <a:endParaRPr lang="en-US"/>
+          </a:p>
+        </p:txBody>
+      </p:sp>
+      <p:sp>
+        <p:nvSpPr>
+          <p:cNvPr id="5" name="Slide Number Placeholder 4"/>
+          <p:cNvSpPr>
+            <a:spLocks noGrp="1"/>
+          </p:cNvSpPr>
+          <p:nvPr>
+            <p:ph type="sldNum" sz="quarter" idx="3"/>
+          </p:nvPr>
+        </p:nvSpPr>
+        <p:spPr>
+          <a:xfrm>
+            <a:off x="11387671" y="10741920"/>
+            <a:ext cx="8711777" cy="567430"/>
+          </a:xfrm>
+          <a:prstGeom prst="rect">
+            <a:avLst/>
+          </a:prstGeom>
+        </p:spPr>
+        <p:txBody>
+          <a:bodyPr vert="horz" lIns="91440" tIns="45720" rIns="91440" bIns="45720" rtlCol="0" anchor="b"/>
+          <a:lstStyle>
+            <a:lvl1pPr algn="r">
+              <a:defRPr sz="1485"/>
+            </a:lvl1pPr>
+          </a:lstStyle>
+          <a:p>
+            <a:fld id="{50305E07-67EA-4042-A3F6-853A8AD8D209}" type="slidenum">
+              <a:rPr lang="en-US" smtClean="0"/>
+            </a:fld>
+            <a:endParaRPr lang="en-US"/>
+          </a:p>
+        </p:txBody>
+      </p:sp>
+    </p:spTree>
+  </p:cSld>
+  <p:clrMap bg1="lt1" tx1="dk1" bg2="lt2" tx2="dk2" accent1="accent1" accent2="accent2" accent3="accent3" accent4="accent4" accent5="accent5" accent6="accent6" hlink="hlink" folHlink="folHlink"/>
+</p:handoutMaster>
 </file>
 
 <file path=ppt/notesMasters/notesMaster1.xml><?xml version="1.0" encoding="utf-8"?>
@@ -2253,387 +2412,6 @@
 </file>
 
 <file path=ppt/slides/slide10.xml><?xml version="1.0" encoding="utf-8"?>
-<p:sld xmlns:a="http://schemas.openxmlformats.org/drawingml/2006/main" xmlns:r="http://schemas.openxmlformats.org/officeDocument/2006/relationships" xmlns:p="http://schemas.openxmlformats.org/presentationml/2006/main">
-  <p:cSld>
-    <p:spTree>
-      <p:nvGrpSpPr>
-        <p:cNvPr id="1" name=""/>
-        <p:cNvGrpSpPr/>
-        <p:nvPr/>
-      </p:nvGrpSpPr>
-      <p:grpSpPr/>
-      <p:sp>
-        <p:nvSpPr>
-          <p:cNvPr id="4" name="Slide Number Placeholder 3"/>
-          <p:cNvSpPr>
-            <a:spLocks noGrp="1"/>
-          </p:cNvSpPr>
-          <p:nvPr>
-            <p:ph type="sldNum" sz="quarter" idx="7"/>
-          </p:nvPr>
-        </p:nvSpPr>
-        <p:spPr/>
-        <p:txBody>
-          <a:bodyPr/>
-          <a:p>
-            <a:fld id="{B6F15528-21DE-4FAA-801E-634DDDAF4B2B}" type="slidenum">
-              <a:rPr/>
-            </a:fld>
-            <a:endParaRPr/>
-          </a:p>
-        </p:txBody>
-      </p:sp>
-      <p:pic>
-        <p:nvPicPr>
-          <p:cNvPr id="5" name="Content Placeholder 4"/>
-          <p:cNvPicPr>
-            <a:picLocks noChangeAspect="1"/>
-          </p:cNvPicPr>
-          <p:nvPr>
-            <p:ph sz="half" idx="2"/>
-          </p:nvPr>
-        </p:nvPicPr>
-        <p:blipFill>
-          <a:blip r:embed="rId1"/>
-          <a:stretch>
-            <a:fillRect/>
-          </a:stretch>
-        </p:blipFill>
-        <p:spPr>
-          <a:xfrm>
-            <a:off x="2279650" y="459740"/>
-            <a:ext cx="16315055" cy="10389870"/>
-          </a:xfrm>
-          <a:prstGeom prst="rect">
-            <a:avLst/>
-          </a:prstGeom>
-        </p:spPr>
-      </p:pic>
-    </p:spTree>
-  </p:cSld>
-  <p:clrMapOvr>
-    <a:masterClrMapping/>
-  </p:clrMapOvr>
-</p:sld>
-</file>
-
-<file path=ppt/slides/slide11.xml><?xml version="1.0" encoding="utf-8"?>
-<p:sld xmlns:a="http://schemas.openxmlformats.org/drawingml/2006/main" xmlns:r="http://schemas.openxmlformats.org/officeDocument/2006/relationships" xmlns:p="http://schemas.openxmlformats.org/presentationml/2006/main" showMasterSp="0">
-  <p:cSld>
-    <p:spTree>
-      <p:nvGrpSpPr>
-        <p:cNvPr id="1" name=""/>
-        <p:cNvGrpSpPr/>
-        <p:nvPr/>
-      </p:nvGrpSpPr>
-      <p:grpSpPr>
-        <a:xfrm>
-          <a:off x="0" y="0"/>
-          <a:ext cx="0" cy="0"/>
-          <a:chOff x="0" y="0"/>
-          <a:chExt cx="0" cy="0"/>
-        </a:xfrm>
-      </p:grpSpPr>
-      <p:sp>
-        <p:nvSpPr>
-          <p:cNvPr id="2" name="object 2"/>
-          <p:cNvSpPr/>
-          <p:nvPr/>
-        </p:nvSpPr>
-        <p:spPr>
-          <a:xfrm>
-            <a:off x="0" y="0"/>
-            <a:ext cx="20104100" cy="11308715"/>
-          </a:xfrm>
-          <a:custGeom>
-            <a:avLst/>
-            <a:gdLst/>
-            <a:ahLst/>
-            <a:cxnLst/>
-            <a:rect l="l" t="t" r="r" b="b"/>
-            <a:pathLst>
-              <a:path w="20104100" h="11308715">
-                <a:moveTo>
-                  <a:pt x="20104099" y="0"/>
-                </a:moveTo>
-                <a:lnTo>
-                  <a:pt x="0" y="0"/>
-                </a:lnTo>
-                <a:lnTo>
-                  <a:pt x="0" y="11308556"/>
-                </a:lnTo>
-                <a:lnTo>
-                  <a:pt x="20104099" y="11308556"/>
-                </a:lnTo>
-                <a:lnTo>
-                  <a:pt x="20104099" y="0"/>
-                </a:lnTo>
-                <a:close/>
-              </a:path>
-            </a:pathLst>
-          </a:custGeom>
-          <a:solidFill>
-            <a:srgbClr val="DDDDDD"/>
-          </a:solidFill>
-        </p:spPr>
-        <p:txBody>
-          <a:bodyPr wrap="square" lIns="0" tIns="0" rIns="0" bIns="0" rtlCol="0"/>
-          <a:lstStyle/>
-          <a:p/>
-        </p:txBody>
-      </p:sp>
-      <p:sp>
-        <p:nvSpPr>
-          <p:cNvPr id="3" name="object 3"/>
-          <p:cNvSpPr txBox="1">
-            <a:spLocks noGrp="1"/>
-          </p:cNvSpPr>
-          <p:nvPr>
-            <p:ph type="title"/>
-          </p:nvPr>
-        </p:nvSpPr>
-        <p:spPr>
-          <a:xfrm>
-            <a:off x="7597832" y="795651"/>
-            <a:ext cx="4908550" cy="930275"/>
-          </a:xfrm>
-          <a:prstGeom prst="rect">
-            <a:avLst/>
-          </a:prstGeom>
-        </p:spPr>
-        <p:txBody>
-          <a:bodyPr vert="horz" wrap="square" lIns="0" tIns="17145" rIns="0" bIns="0" rtlCol="0">
-            <a:spAutoFit/>
-          </a:bodyPr>
-          <a:lstStyle/>
-          <a:p>
-            <a:pPr marL="12700">
-              <a:lnSpc>
-                <a:spcPct val="100000"/>
-              </a:lnSpc>
-              <a:spcBef>
-                <a:spcPts val="135"/>
-              </a:spcBef>
-            </a:pPr>
-            <a:r>
-              <a:rPr sz="5900" spc="-385" dirty="0">
-                <a:solidFill>
-                  <a:srgbClr val="404040"/>
-                </a:solidFill>
-                <a:latin typeface="Verdana" panose="020B0604030504040204"/>
-                <a:cs typeface="Verdana" panose="020B0604030504040204"/>
-              </a:rPr>
-              <a:t>T</a:t>
-            </a:r>
-            <a:r>
-              <a:rPr sz="5900" spc="-295" dirty="0">
-                <a:solidFill>
-                  <a:srgbClr val="404040"/>
-                </a:solidFill>
-                <a:latin typeface="Verdana" panose="020B0604030504040204"/>
-                <a:cs typeface="Verdana" panose="020B0604030504040204"/>
-              </a:rPr>
-              <a:t>r</a:t>
-            </a:r>
-            <a:r>
-              <a:rPr sz="5900" spc="-40" dirty="0">
-                <a:solidFill>
-                  <a:srgbClr val="404040"/>
-                </a:solidFill>
-                <a:latin typeface="Verdana" panose="020B0604030504040204"/>
-                <a:cs typeface="Verdana" panose="020B0604030504040204"/>
-              </a:rPr>
-              <a:t>ansactional</a:t>
-            </a:r>
-            <a:endParaRPr sz="5900">
-              <a:latin typeface="Verdana" panose="020B0604030504040204"/>
-              <a:cs typeface="Verdana" panose="020B0604030504040204"/>
-            </a:endParaRPr>
-          </a:p>
-        </p:txBody>
-      </p:sp>
-      <p:sp>
-        <p:nvSpPr>
-          <p:cNvPr id="4" name="object 4"/>
-          <p:cNvSpPr txBox="1"/>
-          <p:nvPr/>
-        </p:nvSpPr>
-        <p:spPr>
-          <a:xfrm>
-            <a:off x="1147710" y="4301440"/>
-            <a:ext cx="13219430" cy="2538730"/>
-          </a:xfrm>
-          <a:prstGeom prst="rect">
-            <a:avLst/>
-          </a:prstGeom>
-        </p:spPr>
-        <p:txBody>
-          <a:bodyPr vert="horz" wrap="square" lIns="0" tIns="114935" rIns="0" bIns="0" rtlCol="0">
-            <a:spAutoFit/>
-          </a:bodyPr>
-          <a:lstStyle/>
-          <a:p>
-            <a:pPr marL="12700">
-              <a:lnSpc>
-                <a:spcPct val="100000"/>
-              </a:lnSpc>
-              <a:spcBef>
-                <a:spcPts val="905"/>
-              </a:spcBef>
-            </a:pPr>
-            <a:r>
-              <a:rPr sz="3450" spc="5" dirty="0">
-                <a:latin typeface="Courier New" panose="02070309020205020404"/>
-                <a:cs typeface="Courier New" panose="02070309020205020404"/>
-              </a:rPr>
-              <a:t>@Transactional</a:t>
-            </a:r>
-            <a:endParaRPr sz="3450">
-              <a:latin typeface="Courier New" panose="02070309020205020404"/>
-              <a:cs typeface="Courier New" panose="02070309020205020404"/>
-            </a:endParaRPr>
-          </a:p>
-          <a:p>
-            <a:pPr marL="1068070" marR="5080" indent="-1056005">
-              <a:lnSpc>
-                <a:spcPct val="120000"/>
-              </a:lnSpc>
-            </a:pPr>
-            <a:r>
-              <a:rPr sz="3450" dirty="0">
-                <a:latin typeface="Courier New" panose="02070309020205020404"/>
-                <a:cs typeface="Courier New" panose="02070309020205020404"/>
-              </a:rPr>
-              <a:t>public</a:t>
-            </a:r>
-            <a:r>
-              <a:rPr sz="3450" spc="15" dirty="0">
-                <a:latin typeface="Courier New" panose="02070309020205020404"/>
-                <a:cs typeface="Courier New" panose="02070309020205020404"/>
-              </a:rPr>
-              <a:t> </a:t>
-            </a:r>
-            <a:r>
-              <a:rPr sz="3450" dirty="0">
-                <a:latin typeface="Courier New" panose="02070309020205020404"/>
-                <a:cs typeface="Courier New" panose="02070309020205020404"/>
-              </a:rPr>
-              <a:t>void</a:t>
-            </a:r>
-            <a:r>
-              <a:rPr sz="3450" spc="15" dirty="0">
-                <a:latin typeface="Courier New" panose="02070309020205020404"/>
-                <a:cs typeface="Courier New" panose="02070309020205020404"/>
-              </a:rPr>
-              <a:t> </a:t>
-            </a:r>
-            <a:r>
-              <a:rPr sz="3450" dirty="0">
-                <a:latin typeface="Courier New" panose="02070309020205020404"/>
-                <a:cs typeface="Courier New" panose="02070309020205020404"/>
-              </a:rPr>
-              <a:t>createRegistration(Registration</a:t>
-            </a:r>
-            <a:r>
-              <a:rPr sz="3450" spc="15" dirty="0">
-                <a:latin typeface="Courier New" panose="02070309020205020404"/>
-                <a:cs typeface="Courier New" panose="02070309020205020404"/>
-              </a:rPr>
-              <a:t> </a:t>
-            </a:r>
-            <a:r>
-              <a:rPr sz="3450" dirty="0">
-                <a:latin typeface="Courier New" panose="02070309020205020404"/>
-                <a:cs typeface="Courier New" panose="02070309020205020404"/>
-              </a:rPr>
-              <a:t>reg)</a:t>
-            </a:r>
-            <a:r>
-              <a:rPr sz="3450" spc="15" dirty="0">
-                <a:latin typeface="Courier New" panose="02070309020205020404"/>
-                <a:cs typeface="Courier New" panose="02070309020205020404"/>
-              </a:rPr>
-              <a:t> </a:t>
-            </a:r>
-            <a:r>
-              <a:rPr sz="3450" spc="5" dirty="0">
-                <a:latin typeface="Courier New" panose="02070309020205020404"/>
-                <a:cs typeface="Courier New" panose="02070309020205020404"/>
-              </a:rPr>
-              <a:t>{ </a:t>
-            </a:r>
-            <a:r>
-              <a:rPr sz="3450" spc="-2055" dirty="0">
-                <a:latin typeface="Courier New" panose="02070309020205020404"/>
-                <a:cs typeface="Courier New" panose="02070309020205020404"/>
-              </a:rPr>
-              <a:t> </a:t>
-            </a:r>
-            <a:r>
-              <a:rPr sz="3450" spc="5" dirty="0">
-                <a:latin typeface="Courier New" panose="02070309020205020404"/>
-                <a:cs typeface="Courier New" panose="02070309020205020404"/>
-              </a:rPr>
-              <a:t>registrationRepository.save(reg);</a:t>
-            </a:r>
-            <a:endParaRPr sz="3450">
-              <a:latin typeface="Courier New" panose="02070309020205020404"/>
-              <a:cs typeface="Courier New" panose="02070309020205020404"/>
-            </a:endParaRPr>
-          </a:p>
-          <a:p>
-            <a:pPr marL="12700">
-              <a:lnSpc>
-                <a:spcPct val="100000"/>
-              </a:lnSpc>
-              <a:spcBef>
-                <a:spcPts val="805"/>
-              </a:spcBef>
-            </a:pPr>
-            <a:r>
-              <a:rPr sz="3450" spc="5" dirty="0">
-                <a:latin typeface="Courier New" panose="02070309020205020404"/>
-                <a:cs typeface="Courier New" panose="02070309020205020404"/>
-              </a:rPr>
-              <a:t>}</a:t>
-            </a:r>
-            <a:endParaRPr sz="3450">
-              <a:latin typeface="Courier New" panose="02070309020205020404"/>
-              <a:cs typeface="Courier New" panose="02070309020205020404"/>
-            </a:endParaRPr>
-          </a:p>
-        </p:txBody>
-      </p:sp>
-      <p:sp>
-        <p:nvSpPr>
-          <p:cNvPr id="5" name="Slide Number Placeholder 4"/>
-          <p:cNvSpPr>
-            <a:spLocks noGrp="1"/>
-          </p:cNvSpPr>
-          <p:nvPr>
-            <p:ph type="sldNum" sz="quarter" idx="7"/>
-          </p:nvPr>
-        </p:nvSpPr>
-        <p:spPr/>
-        <p:txBody>
-          <a:bodyPr/>
-          <a:p>
-            <a:fld id="{B6F15528-21DE-4FAA-801E-634DDDAF4B2B}" type="slidenum">
-              <a:rPr/>
-            </a:fld>
-            <a:endParaRPr/>
-          </a:p>
-        </p:txBody>
-      </p:sp>
-    </p:spTree>
-  </p:cSld>
-  <p:clrMapOvr>
-    <a:masterClrMapping/>
-  </p:clrMapOvr>
-</p:sld>
-</file>
-
-<file path=ppt/slides/slide12.xml><?xml version="1.0" encoding="utf-8"?>
 <p:sld xmlns:a="http://schemas.openxmlformats.org/drawingml/2006/main" xmlns:r="http://schemas.openxmlformats.org/officeDocument/2006/relationships" xmlns:p="http://schemas.openxmlformats.org/presentationml/2006/main" showMasterSp="0">
   <p:cSld>
     <p:spTree>
@@ -2977,7 +2755,7 @@
 </p:sld>
 </file>
 
-<file path=ppt/slides/slide13.xml><?xml version="1.0" encoding="utf-8"?>
+<file path=ppt/slides/slide11.xml><?xml version="1.0" encoding="utf-8"?>
 <p:sld xmlns:a="http://schemas.openxmlformats.org/drawingml/2006/main" xmlns:r="http://schemas.openxmlformats.org/officeDocument/2006/relationships" xmlns:p="http://schemas.openxmlformats.org/presentationml/2006/main" showMasterSp="0">
   <p:cSld>
     <p:spTree>
@@ -3075,7 +2853,7 @@
         <p:spPr>
           <a:xfrm>
             <a:off x="8656156" y="2339060"/>
-            <a:ext cx="3790315" cy="6534150"/>
+            <a:ext cx="3790315" cy="4604385"/>
           </a:xfrm>
           <a:prstGeom prst="rect">
             <a:avLst/>
@@ -3113,27 +2891,6 @@
                 <a:spcPct val="164000"/>
               </a:lnSpc>
             </a:pPr>
-            <a:r>
-              <a:rPr sz="3950" spc="50" dirty="0">
-                <a:latin typeface="Verdana" panose="020B0604030504040204"/>
-                <a:cs typeface="Verdana" panose="020B0604030504040204"/>
-              </a:rPr>
-              <a:t>Docker </a:t>
-            </a:r>
-            <a:r>
-              <a:rPr sz="3950" spc="55" dirty="0">
-                <a:latin typeface="Verdana" panose="020B0604030504040204"/>
-                <a:cs typeface="Verdana" panose="020B0604030504040204"/>
-              </a:rPr>
-              <a:t> </a:t>
-            </a:r>
-            <a:r>
-              <a:rPr sz="3950" spc="50" dirty="0">
-                <a:latin typeface="Verdana" panose="020B0604030504040204"/>
-                <a:cs typeface="Verdana" panose="020B0604030504040204"/>
-              </a:rPr>
-              <a:t>Docker Tips </a:t>
-            </a:r>
             <a:r>
               <a:rPr sz="3950" spc="-1375" dirty="0">
                 <a:latin typeface="Verdana" panose="020B0604030504040204"/>
@@ -3638,7 +3395,7 @@
         <p:spPr>
           <a:xfrm>
             <a:off x="8544381" y="6276113"/>
-            <a:ext cx="1826895" cy="1612900"/>
+            <a:ext cx="1826895" cy="1614805"/>
           </a:xfrm>
           <a:prstGeom prst="rect">
             <a:avLst/>
@@ -3679,27 +3436,6 @@
                 <a:spcPts val="3010"/>
               </a:spcBef>
             </a:pPr>
-            <a:r>
-              <a:rPr sz="3950" spc="105" dirty="0">
-                <a:latin typeface="Verdana" panose="020B0604030504040204"/>
-                <a:cs typeface="Verdana" panose="020B0604030504040204"/>
-              </a:rPr>
-              <a:t>Doc</a:t>
-            </a:r>
-            <a:r>
-              <a:rPr sz="3950" dirty="0">
-                <a:latin typeface="Verdana" panose="020B0604030504040204"/>
-                <a:cs typeface="Verdana" panose="020B0604030504040204"/>
-              </a:rPr>
-              <a:t>k</a:t>
-            </a:r>
-            <a:r>
-              <a:rPr sz="3950" spc="-10" dirty="0">
-                <a:latin typeface="Verdana" panose="020B0604030504040204"/>
-                <a:cs typeface="Verdana" panose="020B0604030504040204"/>
-              </a:rPr>
-              <a:t>er</a:t>
-            </a:r>
             <a:endParaRPr sz="3950">
               <a:latin typeface="Verdana" panose="020B0604030504040204"/>
               <a:cs typeface="Verdana" panose="020B0604030504040204"/>
@@ -3737,6 +3473,379 @@
 </file>
 
 <file path=ppt/slides/slide4.xml><?xml version="1.0" encoding="utf-8"?>
+<p:sld xmlns:a="http://schemas.openxmlformats.org/drawingml/2006/main" xmlns:r="http://schemas.openxmlformats.org/officeDocument/2006/relationships" xmlns:p="http://schemas.openxmlformats.org/presentationml/2006/main" showMasterSp="0">
+  <p:cSld>
+    <p:spTree>
+      <p:nvGrpSpPr>
+        <p:cNvPr id="1" name=""/>
+        <p:cNvGrpSpPr/>
+        <p:nvPr/>
+      </p:nvGrpSpPr>
+      <p:grpSpPr>
+        <a:xfrm>
+          <a:off x="0" y="0"/>
+          <a:ext cx="0" cy="0"/>
+          <a:chOff x="0" y="0"/>
+          <a:chExt cx="0" cy="0"/>
+        </a:xfrm>
+      </p:grpSpPr>
+      <p:sp>
+        <p:nvSpPr>
+          <p:cNvPr id="2" name="object 2"/>
+          <p:cNvSpPr/>
+          <p:nvPr/>
+        </p:nvSpPr>
+        <p:spPr>
+          <a:xfrm>
+            <a:off x="597688" y="6340484"/>
+            <a:ext cx="18664555" cy="6985"/>
+          </a:xfrm>
+          <a:custGeom>
+            <a:avLst/>
+            <a:gdLst/>
+            <a:ahLst/>
+            <a:cxnLst/>
+            <a:rect l="l" t="t" r="r" b="b"/>
+            <a:pathLst>
+              <a:path w="18664555" h="6985">
+                <a:moveTo>
+                  <a:pt x="18664217" y="0"/>
+                </a:moveTo>
+                <a:lnTo>
+                  <a:pt x="0" y="6789"/>
+                </a:lnTo>
+              </a:path>
+            </a:pathLst>
+          </a:custGeom>
+          <a:ln w="31412">
+            <a:solidFill>
+              <a:srgbClr val="E5E5E5"/>
+            </a:solidFill>
+          </a:ln>
+        </p:spPr>
+        <p:txBody>
+          <a:bodyPr wrap="square" lIns="0" tIns="0" rIns="0" bIns="0" rtlCol="0"/>
+          <a:lstStyle/>
+          <a:p/>
+        </p:txBody>
+      </p:sp>
+      <p:sp>
+        <p:nvSpPr>
+          <p:cNvPr id="3" name="object 3"/>
+          <p:cNvSpPr txBox="1">
+            <a:spLocks noGrp="1"/>
+          </p:cNvSpPr>
+          <p:nvPr>
+            <p:ph type="title"/>
+          </p:nvPr>
+        </p:nvSpPr>
+        <p:spPr>
+          <a:prstGeom prst="rect">
+            <a:avLst/>
+          </a:prstGeom>
+        </p:spPr>
+        <p:txBody>
+          <a:bodyPr vert="horz" wrap="square" lIns="0" tIns="13335" rIns="0" bIns="0" rtlCol="0">
+            <a:spAutoFit/>
+          </a:bodyPr>
+          <a:lstStyle/>
+          <a:p>
+            <a:pPr marL="12700">
+              <a:lnSpc>
+                <a:spcPct val="100000"/>
+              </a:lnSpc>
+              <a:spcBef>
+                <a:spcPts val="105"/>
+              </a:spcBef>
+            </a:pPr>
+            <a:r>
+              <a:rPr dirty="0"/>
+              <a:t>&lt;dependency&gt;</a:t>
+            </a:r>
+            <a:endParaRPr dirty="0"/>
+          </a:p>
+        </p:txBody>
+      </p:sp>
+      <p:sp>
+        <p:nvSpPr>
+          <p:cNvPr id="4" name="object 4"/>
+          <p:cNvSpPr txBox="1"/>
+          <p:nvPr/>
+        </p:nvSpPr>
+        <p:spPr>
+          <a:xfrm>
+            <a:off x="1076565" y="3388243"/>
+            <a:ext cx="17590770" cy="5721985"/>
+          </a:xfrm>
+          <a:prstGeom prst="rect">
+            <a:avLst/>
+          </a:prstGeom>
+        </p:spPr>
+        <p:txBody>
+          <a:bodyPr vert="horz" wrap="square" lIns="0" tIns="13335" rIns="0" bIns="0" rtlCol="0">
+            <a:spAutoFit/>
+          </a:bodyPr>
+          <a:lstStyle/>
+          <a:p>
+            <a:pPr marL="1591310">
+              <a:lnSpc>
+                <a:spcPct val="100000"/>
+              </a:lnSpc>
+              <a:spcBef>
+                <a:spcPts val="105"/>
+              </a:spcBef>
+            </a:pPr>
+            <a:r>
+              <a:rPr sz="3950" spc="-5" dirty="0">
+                <a:latin typeface="Courier New" panose="02070309020205020404"/>
+                <a:cs typeface="Courier New" panose="02070309020205020404"/>
+              </a:rPr>
+              <a:t>&lt;groupId&gt;org.springframework.boot&lt;/groupId&gt;</a:t>
+            </a:r>
+            <a:endParaRPr sz="3950">
+              <a:latin typeface="Courier New" panose="02070309020205020404"/>
+              <a:cs typeface="Courier New" panose="02070309020205020404"/>
+            </a:endParaRPr>
+          </a:p>
+          <a:p>
+            <a:pPr marL="1591310">
+              <a:lnSpc>
+                <a:spcPct val="100000"/>
+              </a:lnSpc>
+              <a:spcBef>
+                <a:spcPts val="210"/>
+              </a:spcBef>
+            </a:pPr>
+            <a:r>
+              <a:rPr sz="3950" dirty="0">
+                <a:latin typeface="Courier New" panose="02070309020205020404"/>
+                <a:cs typeface="Courier New" panose="02070309020205020404"/>
+              </a:rPr>
+              <a:t>&lt;artifactId&gt;spring-boot-starter-data-jpa&lt;/artifactId&gt;</a:t>
+            </a:r>
+            <a:endParaRPr sz="3950">
+              <a:latin typeface="Courier New" panose="02070309020205020404"/>
+              <a:cs typeface="Courier New" panose="02070309020205020404"/>
+            </a:endParaRPr>
+          </a:p>
+          <a:p>
+            <a:pPr marL="83820">
+              <a:lnSpc>
+                <a:spcPct val="100000"/>
+              </a:lnSpc>
+              <a:spcBef>
+                <a:spcPts val="205"/>
+              </a:spcBef>
+            </a:pPr>
+            <a:r>
+              <a:rPr sz="3950" dirty="0">
+                <a:latin typeface="Courier New" panose="02070309020205020404"/>
+                <a:cs typeface="Courier New" panose="02070309020205020404"/>
+              </a:rPr>
+              <a:t>&lt;/dependency&gt;</a:t>
+            </a:r>
+            <a:endParaRPr sz="3950">
+              <a:latin typeface="Courier New" panose="02070309020205020404"/>
+              <a:cs typeface="Courier New" panose="02070309020205020404"/>
+            </a:endParaRPr>
+          </a:p>
+          <a:p>
+            <a:pPr>
+              <a:lnSpc>
+                <a:spcPct val="100000"/>
+              </a:lnSpc>
+            </a:pPr>
+            <a:endParaRPr sz="5200">
+              <a:latin typeface="Courier New" panose="02070309020205020404"/>
+              <a:cs typeface="Courier New" panose="02070309020205020404"/>
+            </a:endParaRPr>
+          </a:p>
+          <a:p>
+            <a:pPr>
+              <a:lnSpc>
+                <a:spcPct val="100000"/>
+              </a:lnSpc>
+              <a:spcBef>
+                <a:spcPts val="10"/>
+              </a:spcBef>
+            </a:pPr>
+            <a:endParaRPr sz="4950">
+              <a:latin typeface="Courier New" panose="02070309020205020404"/>
+              <a:cs typeface="Courier New" panose="02070309020205020404"/>
+            </a:endParaRPr>
+          </a:p>
+          <a:p>
+            <a:pPr marL="12700">
+              <a:lnSpc>
+                <a:spcPct val="100000"/>
+              </a:lnSpc>
+              <a:spcBef>
+                <a:spcPts val="5"/>
+              </a:spcBef>
+            </a:pPr>
+            <a:r>
+              <a:rPr sz="5900" spc="165" dirty="0">
+                <a:solidFill>
+                  <a:srgbClr val="404040"/>
+                </a:solidFill>
+                <a:latin typeface="Verdana" panose="020B0604030504040204"/>
+                <a:cs typeface="Verdana" panose="020B0604030504040204"/>
+              </a:rPr>
+              <a:t>Adding</a:t>
+            </a:r>
+            <a:r>
+              <a:rPr sz="5900" spc="-310" dirty="0">
+                <a:solidFill>
+                  <a:srgbClr val="404040"/>
+                </a:solidFill>
+                <a:latin typeface="Verdana" panose="020B0604030504040204"/>
+                <a:cs typeface="Verdana" panose="020B0604030504040204"/>
+              </a:rPr>
+              <a:t> </a:t>
+            </a:r>
+            <a:r>
+              <a:rPr sz="5900" spc="40" dirty="0">
+                <a:solidFill>
+                  <a:srgbClr val="404040"/>
+                </a:solidFill>
+                <a:latin typeface="Verdana" panose="020B0604030504040204"/>
+                <a:cs typeface="Verdana" panose="020B0604030504040204"/>
+              </a:rPr>
+              <a:t>Jars</a:t>
+            </a:r>
+            <a:r>
+              <a:rPr sz="5900" spc="-305" dirty="0">
+                <a:solidFill>
+                  <a:srgbClr val="404040"/>
+                </a:solidFill>
+                <a:latin typeface="Verdana" panose="020B0604030504040204"/>
+                <a:cs typeface="Verdana" panose="020B0604030504040204"/>
+              </a:rPr>
+              <a:t> </a:t>
+            </a:r>
+            <a:r>
+              <a:rPr sz="5900" spc="20" dirty="0">
+                <a:solidFill>
+                  <a:srgbClr val="404040"/>
+                </a:solidFill>
+                <a:latin typeface="Verdana" panose="020B0604030504040204"/>
+                <a:cs typeface="Verdana" panose="020B0604030504040204"/>
+              </a:rPr>
+              <a:t>with</a:t>
+            </a:r>
+            <a:r>
+              <a:rPr sz="5900" spc="-305" dirty="0">
+                <a:solidFill>
+                  <a:srgbClr val="404040"/>
+                </a:solidFill>
+                <a:latin typeface="Verdana" panose="020B0604030504040204"/>
+                <a:cs typeface="Verdana" panose="020B0604030504040204"/>
+              </a:rPr>
+              <a:t> </a:t>
+            </a:r>
+            <a:r>
+              <a:rPr sz="5900" spc="-90" dirty="0">
+                <a:solidFill>
+                  <a:srgbClr val="404040"/>
+                </a:solidFill>
+                <a:latin typeface="Verdana" panose="020B0604030504040204"/>
+                <a:cs typeface="Verdana" panose="020B0604030504040204"/>
+              </a:rPr>
+              <a:t>Maven</a:t>
+            </a:r>
+            <a:endParaRPr sz="5900">
+              <a:latin typeface="Verdana" panose="020B0604030504040204"/>
+              <a:cs typeface="Verdana" panose="020B0604030504040204"/>
+            </a:endParaRPr>
+          </a:p>
+          <a:p>
+            <a:pPr marL="48895">
+              <a:lnSpc>
+                <a:spcPct val="100000"/>
+              </a:lnSpc>
+              <a:spcBef>
+                <a:spcPts val="1130"/>
+              </a:spcBef>
+            </a:pPr>
+            <a:r>
+              <a:rPr sz="3100" spc="25" dirty="0">
+                <a:latin typeface="Verdana" panose="020B0604030504040204"/>
+                <a:cs typeface="Verdana" panose="020B0604030504040204"/>
+              </a:rPr>
+              <a:t>Version</a:t>
+            </a:r>
+            <a:endParaRPr sz="3100">
+              <a:latin typeface="Verdana" panose="020B0604030504040204"/>
+              <a:cs typeface="Verdana" panose="020B0604030504040204"/>
+            </a:endParaRPr>
+          </a:p>
+          <a:p>
+            <a:pPr marL="48895">
+              <a:lnSpc>
+                <a:spcPct val="100000"/>
+              </a:lnSpc>
+              <a:spcBef>
+                <a:spcPts val="3040"/>
+              </a:spcBef>
+            </a:pPr>
+            <a:r>
+              <a:rPr sz="3100" spc="-20" dirty="0">
+                <a:latin typeface="Verdana" panose="020B0604030504040204"/>
+                <a:cs typeface="Verdana" panose="020B0604030504040204"/>
+              </a:rPr>
+              <a:t>Transitive</a:t>
+            </a:r>
+            <a:r>
+              <a:rPr sz="3100" spc="-165" dirty="0">
+                <a:latin typeface="Verdana" panose="020B0604030504040204"/>
+                <a:cs typeface="Verdana" panose="020B0604030504040204"/>
+              </a:rPr>
+              <a:t> </a:t>
+            </a:r>
+            <a:r>
+              <a:rPr sz="3100" spc="55" dirty="0">
+                <a:latin typeface="Verdana" panose="020B0604030504040204"/>
+                <a:cs typeface="Verdana" panose="020B0604030504040204"/>
+              </a:rPr>
+              <a:t>Dependencies</a:t>
+            </a:r>
+            <a:endParaRPr sz="3100">
+              <a:latin typeface="Verdana" panose="020B0604030504040204"/>
+              <a:cs typeface="Verdana" panose="020B0604030504040204"/>
+            </a:endParaRPr>
+          </a:p>
+        </p:txBody>
+      </p:sp>
+      <p:sp>
+        <p:nvSpPr>
+          <p:cNvPr id="5" name="Slide Number Placeholder 4"/>
+          <p:cNvSpPr>
+            <a:spLocks noGrp="1"/>
+          </p:cNvSpPr>
+          <p:nvPr>
+            <p:ph type="sldNum" sz="quarter" idx="7"/>
+          </p:nvPr>
+        </p:nvSpPr>
+        <p:spPr/>
+        <p:txBody>
+          <a:bodyPr/>
+          <a:p>
+            <a:fld id="{B6F15528-21DE-4FAA-801E-634DDDAF4B2B}" type="slidenum">
+              <a:rPr/>
+            </a:fld>
+            <a:endParaRPr/>
+          </a:p>
+        </p:txBody>
+      </p:sp>
+    </p:spTree>
+  </p:cSld>
+  <p:clrMapOvr>
+    <a:masterClrMapping/>
+  </p:clrMapOvr>
+</p:sld>
+</file>
+
+<file path=ppt/slides/slide5.xml><?xml version="1.0" encoding="utf-8"?>
 <p:sld xmlns:a="http://schemas.openxmlformats.org/drawingml/2006/main" xmlns:r="http://schemas.openxmlformats.org/officeDocument/2006/relationships" xmlns:p="http://schemas.openxmlformats.org/presentationml/2006/main" showMasterSp="0">
   <p:cSld>
     <p:spTree>
@@ -3813,8 +3922,8 @@
         </p:nvSpPr>
         <p:spPr>
           <a:xfrm>
-            <a:off x="6407785" y="795655"/>
-            <a:ext cx="10006965" cy="924560"/>
+            <a:off x="7178662" y="795651"/>
+            <a:ext cx="5747385" cy="930275"/>
           </a:xfrm>
           <a:prstGeom prst="rect">
             <a:avLst/>
@@ -3835,104 +3944,14 @@
               </a:spcBef>
             </a:pPr>
             <a:r>
-              <a:rPr sz="5900" spc="254" dirty="0">
+              <a:rPr sz="5900" spc="-110" dirty="0">
                 <a:solidFill>
                   <a:srgbClr val="404040"/>
                 </a:solidFill>
                 <a:latin typeface="Verdana" panose="020B0604030504040204"/>
                 <a:cs typeface="Verdana" panose="020B0604030504040204"/>
               </a:rPr>
-              <a:t>doc</a:t>
-            </a:r>
-            <a:r>
-              <a:rPr sz="5900" spc="-320" dirty="0">
-                <a:solidFill>
-                  <a:srgbClr val="404040"/>
-                </a:solidFill>
-                <a:latin typeface="Verdana" panose="020B0604030504040204"/>
-                <a:cs typeface="Verdana" panose="020B0604030504040204"/>
-              </a:rPr>
-              <a:t>k</a:t>
-            </a:r>
-            <a:r>
-              <a:rPr sz="5900" spc="-35" dirty="0">
-                <a:solidFill>
-                  <a:srgbClr val="404040"/>
-                </a:solidFill>
-                <a:latin typeface="Verdana" panose="020B0604030504040204"/>
-                <a:cs typeface="Verdana" panose="020B0604030504040204"/>
-              </a:rPr>
-              <a:t>er-</a:t>
-            </a:r>
-            <a:r>
-              <a:rPr sz="5900" spc="-125" dirty="0">
-                <a:solidFill>
-                  <a:srgbClr val="404040"/>
-                </a:solidFill>
-                <a:latin typeface="Verdana" panose="020B0604030504040204"/>
-                <a:cs typeface="Verdana" panose="020B0604030504040204"/>
-              </a:rPr>
-              <a:t>c</a:t>
-            </a:r>
-            <a:r>
-              <a:rPr sz="5900" spc="40" dirty="0">
-                <a:solidFill>
-                  <a:srgbClr val="404040"/>
-                </a:solidFill>
-                <a:latin typeface="Verdana" panose="020B0604030504040204"/>
-                <a:cs typeface="Verdana" panose="020B0604030504040204"/>
-              </a:rPr>
-              <a:t>omp</a:t>
-            </a:r>
-            <a:r>
-              <a:rPr lang="en-US" sz="5900" spc="40" dirty="0">
-                <a:solidFill>
-                  <a:srgbClr val="404040"/>
-                </a:solidFill>
-                <a:latin typeface="Verdana" panose="020B0604030504040204"/>
-                <a:cs typeface="Verdana" panose="020B0604030504040204"/>
-              </a:rPr>
-              <a:t>o</a:t>
-            </a:r>
-            <a:r>
-              <a:rPr sz="5900" spc="40" dirty="0">
-                <a:solidFill>
-                  <a:srgbClr val="404040"/>
-                </a:solidFill>
-                <a:latin typeface="Verdana" panose="020B0604030504040204"/>
-                <a:cs typeface="Verdana" panose="020B0604030504040204"/>
-              </a:rPr>
-              <a:t>s</a:t>
-            </a:r>
-            <a:r>
-              <a:rPr sz="5900" spc="-25" dirty="0">
-                <a:solidFill>
-                  <a:srgbClr val="404040"/>
-                </a:solidFill>
-                <a:latin typeface="Verdana" panose="020B0604030504040204"/>
-                <a:cs typeface="Verdana" panose="020B0604030504040204"/>
-              </a:rPr>
-              <a:t>e</a:t>
-            </a:r>
-            <a:r>
-              <a:rPr sz="5900" spc="-1145" dirty="0">
-                <a:solidFill>
-                  <a:srgbClr val="404040"/>
-                </a:solidFill>
-                <a:latin typeface="Verdana" panose="020B0604030504040204"/>
-                <a:cs typeface="Verdana" panose="020B0604030504040204"/>
-              </a:rPr>
-              <a:t>.</a:t>
-            </a:r>
-            <a:r>
-              <a:rPr sz="5900" spc="-80" dirty="0">
-                <a:solidFill>
-                  <a:srgbClr val="404040"/>
-                </a:solidFill>
-                <a:latin typeface="Verdana" panose="020B0604030504040204"/>
-                <a:cs typeface="Verdana" panose="020B0604030504040204"/>
-              </a:rPr>
-              <a:t>yml</a:t>
+              <a:t>persistence.xml</a:t>
             </a:r>
             <a:endParaRPr sz="5900">
               <a:latin typeface="Verdana" panose="020B0604030504040204"/>
@@ -3949,15 +3968,15 @@
         </p:nvSpPr>
         <p:spPr>
           <a:xfrm>
-            <a:off x="2132537" y="2495036"/>
-            <a:ext cx="9979025" cy="6283325"/>
+            <a:off x="1147710" y="3359061"/>
+            <a:ext cx="16878300" cy="4423410"/>
           </a:xfrm>
           <a:prstGeom prst="rect">
             <a:avLst/>
           </a:prstGeom>
         </p:spPr>
         <p:txBody>
-          <a:bodyPr vert="horz" wrap="square" lIns="0" tIns="13335" rIns="0" bIns="0" rtlCol="0">
+          <a:bodyPr vert="horz" wrap="square" lIns="0" tIns="114935" rIns="0" bIns="0" rtlCol="0">
             <a:spAutoFit/>
           </a:bodyPr>
           <a:lstStyle/>
@@ -3967,678 +3986,171 @@
                 <a:spcPct val="100000"/>
               </a:lnSpc>
               <a:spcBef>
-                <a:spcPts val="105"/>
+                <a:spcPts val="905"/>
               </a:spcBef>
             </a:pPr>
             <a:r>
-              <a:rPr sz="3950" dirty="0">
-                <a:latin typeface="Courier New" panose="02070309020205020404"/>
-                <a:cs typeface="Courier New" panose="02070309020205020404"/>
-              </a:rPr>
-              <a:t>db:</a:t>
-            </a:r>
-            <a:endParaRPr sz="3950">
+              <a:rPr sz="3450" dirty="0">
+                <a:latin typeface="Courier New" panose="02070309020205020404"/>
+                <a:cs typeface="Courier New" panose="02070309020205020404"/>
+              </a:rPr>
+              <a:t>&lt;?xml</a:t>
+            </a:r>
+            <a:r>
+              <a:rPr sz="3450" spc="5" dirty="0">
+                <a:latin typeface="Courier New" panose="02070309020205020404"/>
+                <a:cs typeface="Courier New" panose="02070309020205020404"/>
+              </a:rPr>
+              <a:t> </a:t>
+            </a:r>
+            <a:r>
+              <a:rPr sz="3450" dirty="0">
+                <a:latin typeface="Courier New" panose="02070309020205020404"/>
+                <a:cs typeface="Courier New" panose="02070309020205020404"/>
+              </a:rPr>
+              <a:t>version="1.0"</a:t>
+            </a:r>
+            <a:r>
+              <a:rPr sz="3450" spc="5" dirty="0">
+                <a:latin typeface="Courier New" panose="02070309020205020404"/>
+                <a:cs typeface="Courier New" panose="02070309020205020404"/>
+              </a:rPr>
+              <a:t> encoding="UTF-8"?&gt;</a:t>
+            </a:r>
+            <a:endParaRPr sz="3450">
               <a:latin typeface="Courier New" panose="02070309020205020404"/>
               <a:cs typeface="Courier New" panose="02070309020205020404"/>
             </a:endParaRPr>
           </a:p>
           <a:p>
-            <a:pPr marL="615315" marR="1513840">
+            <a:pPr marL="1068070" marR="3399790" indent="-1056005">
               <a:lnSpc>
-                <a:spcPts val="4950"/>
+                <a:spcPct val="120000"/>
               </a:lnSpc>
-              <a:spcBef>
-                <a:spcPts val="200"/>
-              </a:spcBef>
             </a:pPr>
             <a:r>
-              <a:rPr sz="3950" dirty="0">
-                <a:latin typeface="Courier New" panose="02070309020205020404"/>
-                <a:cs typeface="Courier New" panose="02070309020205020404"/>
-              </a:rPr>
-              <a:t>image: mysql:5.7 </a:t>
-            </a:r>
-            <a:r>
-              <a:rPr sz="3950" spc="5" dirty="0">
+              <a:rPr sz="3450" dirty="0">
+                <a:latin typeface="Courier New" panose="02070309020205020404"/>
+                <a:cs typeface="Courier New" panose="02070309020205020404"/>
+              </a:rPr>
+              <a:t>&lt;persistence </a:t>
+            </a:r>
+            <a:r>
+              <a:rPr sz="3450" spc="5" dirty="0">
+                <a:latin typeface="Courier New" panose="02070309020205020404"/>
+                <a:cs typeface="Courier New" panose="02070309020205020404"/>
+              </a:rPr>
+              <a:t>version="2.1" </a:t>
+            </a:r>
+            <a:r>
+              <a:rPr sz="3450" spc="10" dirty="0">
                 <a:latin typeface="Courier New" panose="02070309020205020404"/>
                 <a:cs typeface="Courier New" panose="02070309020205020404"/>
               </a:rPr>
               <a:t> </a:t>
             </a:r>
             <a:r>
-              <a:rPr sz="3950" spc="-5" dirty="0">
-                <a:latin typeface="Courier New" panose="02070309020205020404"/>
-                <a:cs typeface="Courier New" panose="02070309020205020404"/>
-              </a:rPr>
-              <a:t>container_name:</a:t>
-            </a:r>
-            <a:r>
-              <a:rPr sz="3950" spc="10" dirty="0">
-                <a:latin typeface="Courier New" panose="02070309020205020404"/>
-                <a:cs typeface="Courier New" panose="02070309020205020404"/>
-              </a:rPr>
-              <a:t> </a:t>
-            </a:r>
-            <a:r>
-              <a:rPr sz="3950" dirty="0">
-                <a:latin typeface="Courier New" panose="02070309020205020404"/>
-                <a:cs typeface="Courier New" panose="02070309020205020404"/>
-              </a:rPr>
-              <a:t>conference </a:t>
-            </a:r>
-            <a:r>
-              <a:rPr sz="3950" spc="-2355" dirty="0">
-                <a:latin typeface="Courier New" panose="02070309020205020404"/>
-                <a:cs typeface="Courier New" panose="02070309020205020404"/>
-              </a:rPr>
-              <a:t> </a:t>
-            </a:r>
-            <a:r>
-              <a:rPr sz="3950" dirty="0">
-                <a:latin typeface="Courier New" panose="02070309020205020404"/>
-                <a:cs typeface="Courier New" panose="02070309020205020404"/>
-              </a:rPr>
-              <a:t>ports:</a:t>
-            </a:r>
-            <a:endParaRPr sz="3950">
+              <a:rPr sz="3450" dirty="0">
+                <a:latin typeface="Courier New" panose="02070309020205020404"/>
+                <a:cs typeface="Courier New" panose="02070309020205020404"/>
+                <a:hlinkClick r:id="rId1"/>
+              </a:rPr>
+              <a:t>xmlns="http://xmlns.jcp.org/xml/ns/persistence"</a:t>
+            </a:r>
+            <a:endParaRPr sz="3450">
               <a:latin typeface="Courier New" panose="02070309020205020404"/>
               <a:cs typeface="Courier New" panose="02070309020205020404"/>
             </a:endParaRPr>
           </a:p>
           <a:p>
-            <a:pPr marL="1218565">
+            <a:pPr marL="1068070" marR="233680" indent="-302260">
               <a:lnSpc>
-                <a:spcPct val="100000"/>
+                <a:spcPct val="120000"/>
               </a:lnSpc>
             </a:pPr>
             <a:r>
-              <a:rPr sz="3950" spc="5" dirty="0">
-                <a:latin typeface="Courier New" panose="02070309020205020404"/>
-                <a:cs typeface="Courier New" panose="02070309020205020404"/>
-              </a:rPr>
-              <a:t>-</a:t>
-            </a:r>
-            <a:r>
-              <a:rPr sz="3950" spc="-40" dirty="0">
+              <a:rPr sz="3450" spc="5" dirty="0">
+                <a:latin typeface="Courier New" panose="02070309020205020404"/>
+                <a:cs typeface="Courier New" panose="02070309020205020404"/>
+                <a:hlinkClick r:id="rId2"/>
+              </a:rPr>
+              <a:t>xmlns:xsi="http://www.w3.org/2001/XMLSchema-</a:t>
+            </a:r>
+            <a:r>
+              <a:rPr sz="3450" spc="5" dirty="0">
+                <a:latin typeface="Courier New" panose="02070309020205020404"/>
+                <a:cs typeface="Courier New" panose="02070309020205020404"/>
+              </a:rPr>
+              <a:t>instance" </a:t>
+            </a:r>
+            <a:r>
+              <a:rPr sz="3450" spc="10" dirty="0">
                 <a:latin typeface="Courier New" panose="02070309020205020404"/>
                 <a:cs typeface="Courier New" panose="02070309020205020404"/>
               </a:rPr>
               <a:t> </a:t>
             </a:r>
             <a:r>
-              <a:rPr sz="3950" dirty="0">
-                <a:latin typeface="Courier New" panose="02070309020205020404"/>
-                <a:cs typeface="Courier New" panose="02070309020205020404"/>
-              </a:rPr>
-              <a:t>3306:3306</a:t>
-            </a:r>
-            <a:endParaRPr sz="3950">
+              <a:rPr sz="3450" dirty="0">
+                <a:latin typeface="Courier New" panose="02070309020205020404"/>
+                <a:cs typeface="Courier New" panose="02070309020205020404"/>
+                <a:hlinkClick r:id="rId1"/>
+              </a:rPr>
+              <a:t>xsi:schemaLocation="http://xmlns.jcp.org/xml/ns/persistence</a:t>
+            </a:r>
+            <a:endParaRPr sz="3450">
               <a:latin typeface="Courier New" panose="02070309020205020404"/>
               <a:cs typeface="Courier New" panose="02070309020205020404"/>
             </a:endParaRPr>
           </a:p>
           <a:p>
-            <a:pPr marL="615315">
+            <a:pPr marL="766445">
               <a:lnSpc>
                 <a:spcPct val="100000"/>
               </a:lnSpc>
               <a:spcBef>
-                <a:spcPts val="205"/>
+                <a:spcPts val="805"/>
               </a:spcBef>
             </a:pPr>
             <a:r>
-              <a:rPr sz="3950" dirty="0">
-                <a:latin typeface="Courier New" panose="02070309020205020404"/>
-                <a:cs typeface="Courier New" panose="02070309020205020404"/>
-              </a:rPr>
-              <a:t>volumes:</a:t>
-            </a:r>
-            <a:endParaRPr sz="3950">
+              <a:rPr sz="3450" spc="5" dirty="0">
+                <a:latin typeface="Courier New" panose="02070309020205020404"/>
+                <a:cs typeface="Courier New" panose="02070309020205020404"/>
+                <a:hlinkClick r:id="rId3"/>
+              </a:rPr>
+              <a:t>http://xmlns.jcp.org/xml/ns/persistence/persistence_2_1.xsd"&gt;</a:t>
+            </a:r>
+            <a:endParaRPr sz="3450">
               <a:latin typeface="Courier New" panose="02070309020205020404"/>
               <a:cs typeface="Courier New" panose="02070309020205020404"/>
             </a:endParaRPr>
           </a:p>
-          <a:p>
-            <a:pPr marL="615315" marR="5080" indent="602615">
-              <a:lnSpc>
-                <a:spcPts val="4950"/>
-              </a:lnSpc>
-              <a:spcBef>
-                <a:spcPts val="195"/>
-              </a:spcBef>
-            </a:pPr>
-            <a:r>
-              <a:rPr sz="3950" spc="5" dirty="0">
-                <a:latin typeface="Courier New" panose="02070309020205020404"/>
-                <a:cs typeface="Courier New" panose="02070309020205020404"/>
-              </a:rPr>
-              <a:t>-</a:t>
-            </a:r>
-            <a:r>
-              <a:rPr sz="3950" spc="20" dirty="0">
-                <a:latin typeface="Courier New" panose="02070309020205020404"/>
-                <a:cs typeface="Courier New" panose="02070309020205020404"/>
-              </a:rPr>
-              <a:t> </a:t>
-            </a:r>
-            <a:r>
-              <a:rPr sz="3950" dirty="0">
-                <a:latin typeface="Courier New" panose="02070309020205020404"/>
-                <a:cs typeface="Courier New" panose="02070309020205020404"/>
-              </a:rPr>
-              <a:t>"./.data/db:/var/lib/mysql" </a:t>
-            </a:r>
-            <a:r>
-              <a:rPr sz="3950" spc="-2355" dirty="0">
-                <a:latin typeface="Courier New" panose="02070309020205020404"/>
-                <a:cs typeface="Courier New" panose="02070309020205020404"/>
-              </a:rPr>
-              <a:t> </a:t>
-            </a:r>
-            <a:r>
-              <a:rPr sz="3950" dirty="0">
-                <a:latin typeface="Courier New" panose="02070309020205020404"/>
-                <a:cs typeface="Courier New" panose="02070309020205020404"/>
-              </a:rPr>
-              <a:t>environment:</a:t>
-            </a:r>
-            <a:endParaRPr sz="3950">
-              <a:latin typeface="Courier New" panose="02070309020205020404"/>
-              <a:cs typeface="Courier New" panose="02070309020205020404"/>
-            </a:endParaRPr>
-          </a:p>
-          <a:p>
-            <a:pPr marL="1218565">
-              <a:lnSpc>
-                <a:spcPct val="100000"/>
-              </a:lnSpc>
-              <a:spcBef>
-                <a:spcPts val="5"/>
-              </a:spcBef>
-            </a:pPr>
-            <a:r>
-              <a:rPr sz="3950" spc="-5" dirty="0">
-                <a:latin typeface="Courier New" panose="02070309020205020404"/>
-                <a:cs typeface="Courier New" panose="02070309020205020404"/>
-              </a:rPr>
-              <a:t>MYSQL_ROOT_PASSWORD:</a:t>
-            </a:r>
-            <a:r>
-              <a:rPr sz="3950" spc="5" dirty="0">
-                <a:latin typeface="Courier New" panose="02070309020205020404"/>
-                <a:cs typeface="Courier New" panose="02070309020205020404"/>
-              </a:rPr>
-              <a:t> </a:t>
-            </a:r>
-            <a:r>
-              <a:rPr sz="3950" dirty="0">
-                <a:latin typeface="Courier New" panose="02070309020205020404"/>
-                <a:cs typeface="Courier New" panose="02070309020205020404"/>
-              </a:rPr>
-              <a:t>pass</a:t>
-            </a:r>
-            <a:endParaRPr sz="3950">
-              <a:latin typeface="Courier New" panose="02070309020205020404"/>
-              <a:cs typeface="Courier New" panose="02070309020205020404"/>
-            </a:endParaRPr>
-          </a:p>
-          <a:p>
-            <a:pPr marL="1218565">
-              <a:lnSpc>
-                <a:spcPct val="100000"/>
-              </a:lnSpc>
-              <a:spcBef>
-                <a:spcPts val="210"/>
-              </a:spcBef>
-            </a:pPr>
-            <a:r>
-              <a:rPr sz="3950" spc="-5" dirty="0">
-                <a:latin typeface="Courier New" panose="02070309020205020404"/>
-                <a:cs typeface="Courier New" panose="02070309020205020404"/>
-              </a:rPr>
-              <a:t>MYSQL_DATABASE:</a:t>
-            </a:r>
-            <a:r>
-              <a:rPr sz="3950" spc="5" dirty="0">
-                <a:latin typeface="Courier New" panose="02070309020205020404"/>
-                <a:cs typeface="Courier New" panose="02070309020205020404"/>
-              </a:rPr>
-              <a:t> </a:t>
-            </a:r>
-            <a:r>
-              <a:rPr sz="3950" dirty="0">
-                <a:latin typeface="Courier New" panose="02070309020205020404"/>
-                <a:cs typeface="Courier New" panose="02070309020205020404"/>
-              </a:rPr>
-              <a:t>conference</a:t>
-            </a:r>
-            <a:endParaRPr sz="3950">
-              <a:latin typeface="Courier New" panose="02070309020205020404"/>
-              <a:cs typeface="Courier New" panose="02070309020205020404"/>
-            </a:endParaRPr>
-          </a:p>
-        </p:txBody>
-      </p:sp>
-      <p:sp>
-        <p:nvSpPr>
-          <p:cNvPr id="5" name="Slide Number Placeholder 4"/>
-          <p:cNvSpPr>
-            <a:spLocks noGrp="1"/>
-          </p:cNvSpPr>
-          <p:nvPr>
-            <p:ph type="sldNum" sz="quarter" idx="7"/>
-          </p:nvPr>
-        </p:nvSpPr>
-        <p:spPr/>
-        <p:txBody>
-          <a:bodyPr/>
-          <a:p>
-            <a:fld id="{B6F15528-21DE-4FAA-801E-634DDDAF4B2B}" type="slidenum">
-              <a:rPr/>
-            </a:fld>
-            <a:endParaRPr/>
-          </a:p>
-        </p:txBody>
-      </p:sp>
-    </p:spTree>
-  </p:cSld>
-  <p:clrMapOvr>
-    <a:masterClrMapping/>
-  </p:clrMapOvr>
-</p:sld>
-</file>
-
-<file path=ppt/slides/slide5.xml><?xml version="1.0" encoding="utf-8"?>
-<p:sld xmlns:a="http://schemas.openxmlformats.org/drawingml/2006/main" xmlns:r="http://schemas.openxmlformats.org/officeDocument/2006/relationships" xmlns:p="http://schemas.openxmlformats.org/presentationml/2006/main" showMasterSp="0">
-  <p:cSld>
-    <p:spTree>
-      <p:nvGrpSpPr>
-        <p:cNvPr id="1" name=""/>
-        <p:cNvGrpSpPr/>
-        <p:nvPr/>
-      </p:nvGrpSpPr>
-      <p:grpSpPr>
-        <a:xfrm>
-          <a:off x="0" y="0"/>
-          <a:ext cx="0" cy="0"/>
-          <a:chOff x="0" y="0"/>
-          <a:chExt cx="0" cy="0"/>
-        </a:xfrm>
-      </p:grpSpPr>
-      <p:pic>
-        <p:nvPicPr>
-          <p:cNvPr id="2" name="object 2"/>
-          <p:cNvPicPr/>
-          <p:nvPr/>
-        </p:nvPicPr>
-        <p:blipFill>
-          <a:blip r:embed="rId1" cstate="print"/>
-          <a:stretch>
-            <a:fillRect/>
-          </a:stretch>
-        </p:blipFill>
-        <p:spPr>
-          <a:xfrm>
-            <a:off x="0" y="0"/>
-            <a:ext cx="7643746" cy="11308556"/>
-          </a:xfrm>
-          <a:prstGeom prst="rect">
-            <a:avLst/>
-          </a:prstGeom>
-        </p:spPr>
-      </p:pic>
-      <p:sp>
-        <p:nvSpPr>
-          <p:cNvPr id="3" name="object 3"/>
-          <p:cNvSpPr txBox="1"/>
-          <p:nvPr/>
-        </p:nvSpPr>
-        <p:spPr>
-          <a:xfrm>
-            <a:off x="1607815" y="3295699"/>
-            <a:ext cx="4417695" cy="930275"/>
-          </a:xfrm>
-          <a:prstGeom prst="rect">
-            <a:avLst/>
-          </a:prstGeom>
-        </p:spPr>
-        <p:txBody>
-          <a:bodyPr vert="horz" wrap="square" lIns="0" tIns="17145" rIns="0" bIns="0" rtlCol="0">
-            <a:spAutoFit/>
-          </a:bodyPr>
-          <a:lstStyle/>
           <a:p>
             <a:pPr marL="12700">
               <a:lnSpc>
                 <a:spcPct val="100000"/>
               </a:lnSpc>
               <a:spcBef>
-                <a:spcPts val="135"/>
+                <a:spcPts val="805"/>
               </a:spcBef>
             </a:pPr>
             <a:r>
-              <a:rPr sz="5900" spc="20" dirty="0">
-                <a:solidFill>
-                  <a:srgbClr val="FFFFFF"/>
-                </a:solidFill>
-                <a:latin typeface="Verdana" panose="020B0604030504040204"/>
-                <a:cs typeface="Verdana" panose="020B0604030504040204"/>
-              </a:rPr>
-              <a:t>Docker</a:t>
-            </a:r>
-            <a:r>
-              <a:rPr sz="5900" spc="-380" dirty="0">
-                <a:solidFill>
-                  <a:srgbClr val="FFFFFF"/>
-                </a:solidFill>
-                <a:latin typeface="Verdana" panose="020B0604030504040204"/>
-                <a:cs typeface="Verdana" panose="020B0604030504040204"/>
-              </a:rPr>
-              <a:t> </a:t>
-            </a:r>
-            <a:r>
-              <a:rPr sz="5900" spc="-15" dirty="0">
-                <a:solidFill>
-                  <a:srgbClr val="FFFFFF"/>
-                </a:solidFill>
-                <a:latin typeface="Verdana" panose="020B0604030504040204"/>
-                <a:cs typeface="Verdana" panose="020B0604030504040204"/>
-              </a:rPr>
-              <a:t>Tips</a:t>
-            </a:r>
-            <a:endParaRPr sz="5900">
-              <a:latin typeface="Verdana" panose="020B0604030504040204"/>
-              <a:cs typeface="Verdana" panose="020B0604030504040204"/>
+              <a:rPr sz="3450" spc="5" dirty="0">
+                <a:latin typeface="Courier New" panose="02070309020205020404"/>
+                <a:cs typeface="Courier New" panose="02070309020205020404"/>
+              </a:rPr>
+              <a:t>//…</a:t>
+            </a:r>
+            <a:endParaRPr sz="3450">
+              <a:latin typeface="Courier New" panose="02070309020205020404"/>
+              <a:cs typeface="Courier New" panose="02070309020205020404"/>
             </a:endParaRPr>
           </a:p>
         </p:txBody>
       </p:sp>
       <p:sp>
         <p:nvSpPr>
-          <p:cNvPr id="4" name="object 4"/>
-          <p:cNvSpPr txBox="1">
-            <a:spLocks noGrp="1"/>
-          </p:cNvSpPr>
-          <p:nvPr>
-            <p:ph type="title"/>
-          </p:nvPr>
-        </p:nvSpPr>
-        <p:spPr>
-          <a:xfrm>
-            <a:off x="9066548" y="2831192"/>
-            <a:ext cx="5834380" cy="2597150"/>
-          </a:xfrm>
-          <a:prstGeom prst="rect">
-            <a:avLst/>
-          </a:prstGeom>
-        </p:spPr>
-        <p:txBody>
-          <a:bodyPr vert="horz" wrap="square" lIns="0" tIns="13335" rIns="0" bIns="0" rtlCol="0">
-            <a:spAutoFit/>
-          </a:bodyPr>
-          <a:lstStyle/>
-          <a:p>
-            <a:pPr marL="12700">
-              <a:lnSpc>
-                <a:spcPct val="100000"/>
-              </a:lnSpc>
-              <a:spcBef>
-                <a:spcPts val="105"/>
-              </a:spcBef>
-            </a:pPr>
-            <a:r>
-              <a:rPr spc="60" dirty="0">
-                <a:latin typeface="Verdana" panose="020B0604030504040204"/>
-                <a:cs typeface="Verdana" panose="020B0604030504040204"/>
-              </a:rPr>
-              <a:t>docker-compose</a:t>
-            </a:r>
-            <a:r>
-              <a:rPr spc="-229" dirty="0">
-                <a:latin typeface="Verdana" panose="020B0604030504040204"/>
-                <a:cs typeface="Verdana" panose="020B0604030504040204"/>
-              </a:rPr>
-              <a:t> </a:t>
-            </a:r>
-            <a:r>
-              <a:rPr spc="70" dirty="0">
-                <a:latin typeface="Verdana" panose="020B0604030504040204"/>
-                <a:cs typeface="Verdana" panose="020B0604030504040204"/>
-              </a:rPr>
-              <a:t>up</a:t>
-            </a:r>
-            <a:r>
-              <a:rPr spc="-225" dirty="0">
-                <a:latin typeface="Verdana" panose="020B0604030504040204"/>
-                <a:cs typeface="Verdana" panose="020B0604030504040204"/>
-              </a:rPr>
-              <a:t> </a:t>
-            </a:r>
-            <a:r>
-              <a:rPr spc="5" dirty="0">
-                <a:latin typeface="Verdana" panose="020B0604030504040204"/>
-                <a:cs typeface="Verdana" panose="020B0604030504040204"/>
-              </a:rPr>
-              <a:t>-d</a:t>
-            </a:r>
-            <a:endParaRPr spc="5" dirty="0">
-              <a:latin typeface="Verdana" panose="020B0604030504040204"/>
-              <a:cs typeface="Verdana" panose="020B0604030504040204"/>
-            </a:endParaRPr>
-          </a:p>
-          <a:p>
-            <a:pPr marL="12700" marR="5080">
-              <a:lnSpc>
-                <a:spcPct val="164000"/>
-              </a:lnSpc>
-            </a:pPr>
-            <a:r>
-              <a:rPr spc="60" dirty="0">
-                <a:latin typeface="Verdana" panose="020B0604030504040204"/>
-                <a:cs typeface="Verdana" panose="020B0604030504040204"/>
-              </a:rPr>
-              <a:t>docker-compose</a:t>
-            </a:r>
-            <a:r>
-              <a:rPr spc="-265" dirty="0">
-                <a:latin typeface="Verdana" panose="020B0604030504040204"/>
-                <a:cs typeface="Verdana" panose="020B0604030504040204"/>
-              </a:rPr>
-              <a:t> </a:t>
-            </a:r>
-            <a:r>
-              <a:rPr spc="105" dirty="0">
-                <a:latin typeface="Verdana" panose="020B0604030504040204"/>
-                <a:cs typeface="Verdana" panose="020B0604030504040204"/>
-              </a:rPr>
-              <a:t>down </a:t>
-            </a:r>
-            <a:r>
-              <a:rPr spc="-1370" dirty="0">
-                <a:latin typeface="Verdana" panose="020B0604030504040204"/>
-                <a:cs typeface="Verdana" panose="020B0604030504040204"/>
-              </a:rPr>
-              <a:t> </a:t>
-            </a:r>
-            <a:r>
-              <a:rPr spc="70" dirty="0">
-                <a:latin typeface="Verdana" panose="020B0604030504040204"/>
-                <a:cs typeface="Verdana" panose="020B0604030504040204"/>
-              </a:rPr>
-              <a:t>docker</a:t>
-            </a:r>
-            <a:r>
-              <a:rPr spc="-210" dirty="0">
-                <a:latin typeface="Verdana" panose="020B0604030504040204"/>
-                <a:cs typeface="Verdana" panose="020B0604030504040204"/>
-              </a:rPr>
-              <a:t> </a:t>
-            </a:r>
-            <a:r>
-              <a:rPr spc="55" dirty="0">
-                <a:latin typeface="Verdana" panose="020B0604030504040204"/>
-                <a:cs typeface="Verdana" panose="020B0604030504040204"/>
-              </a:rPr>
-              <a:t>ps</a:t>
-            </a:r>
-            <a:endParaRPr spc="55" dirty="0">
-              <a:latin typeface="Verdana" panose="020B0604030504040204"/>
-              <a:cs typeface="Verdana" panose="020B0604030504040204"/>
-            </a:endParaRPr>
-          </a:p>
-        </p:txBody>
-      </p:sp>
-      <p:sp>
-        <p:nvSpPr>
-          <p:cNvPr id="5" name="object 5"/>
-          <p:cNvSpPr txBox="1"/>
-          <p:nvPr/>
-        </p:nvSpPr>
-        <p:spPr>
-          <a:xfrm>
-            <a:off x="9066548" y="5783981"/>
-            <a:ext cx="10024745" cy="1612900"/>
-          </a:xfrm>
-          <a:prstGeom prst="rect">
-            <a:avLst/>
-          </a:prstGeom>
-        </p:spPr>
-        <p:txBody>
-          <a:bodyPr vert="horz" wrap="square" lIns="0" tIns="13335" rIns="0" bIns="0" rtlCol="0">
-            <a:spAutoFit/>
-          </a:bodyPr>
-          <a:lstStyle/>
-          <a:p>
-            <a:pPr marL="12700">
-              <a:lnSpc>
-                <a:spcPct val="100000"/>
-              </a:lnSpc>
-              <a:spcBef>
-                <a:spcPts val="105"/>
-              </a:spcBef>
-            </a:pPr>
-            <a:r>
-              <a:rPr sz="3950" spc="70" dirty="0">
-                <a:latin typeface="Verdana" panose="020B0604030504040204"/>
-                <a:cs typeface="Verdana" panose="020B0604030504040204"/>
-              </a:rPr>
-              <a:t>docker</a:t>
-            </a:r>
-            <a:r>
-              <a:rPr sz="3950" spc="-220" dirty="0">
-                <a:latin typeface="Verdana" panose="020B0604030504040204"/>
-                <a:cs typeface="Verdana" panose="020B0604030504040204"/>
-              </a:rPr>
-              <a:t> </a:t>
-            </a:r>
-            <a:r>
-              <a:rPr sz="3950" spc="55" dirty="0">
-                <a:latin typeface="Verdana" panose="020B0604030504040204"/>
-                <a:cs typeface="Verdana" panose="020B0604030504040204"/>
-              </a:rPr>
-              <a:t>inspect</a:t>
-            </a:r>
-            <a:r>
-              <a:rPr sz="3950" spc="-215" dirty="0">
-                <a:latin typeface="Verdana" panose="020B0604030504040204"/>
-                <a:cs typeface="Verdana" panose="020B0604030504040204"/>
-              </a:rPr>
-              <a:t> </a:t>
-            </a:r>
-            <a:r>
-              <a:rPr sz="3950" spc="-204" dirty="0">
-                <a:latin typeface="Verdana" panose="020B0604030504040204"/>
-                <a:cs typeface="Verdana" panose="020B0604030504040204"/>
-              </a:rPr>
-              <a:t>&lt;pid&gt;</a:t>
-            </a:r>
-            <a:endParaRPr sz="3950">
-              <a:latin typeface="Verdana" panose="020B0604030504040204"/>
-              <a:cs typeface="Verdana" panose="020B0604030504040204"/>
-            </a:endParaRPr>
-          </a:p>
-          <a:p>
-            <a:pPr marL="12700">
-              <a:lnSpc>
-                <a:spcPct val="100000"/>
-              </a:lnSpc>
-              <a:spcBef>
-                <a:spcPts val="3010"/>
-              </a:spcBef>
-            </a:pPr>
-            <a:r>
-              <a:rPr sz="3950" spc="70" dirty="0">
-                <a:latin typeface="Verdana" panose="020B0604030504040204"/>
-                <a:cs typeface="Verdana" panose="020B0604030504040204"/>
-              </a:rPr>
-              <a:t>docker</a:t>
-            </a:r>
-            <a:r>
-              <a:rPr sz="3950" spc="-204" dirty="0">
-                <a:latin typeface="Verdana" panose="020B0604030504040204"/>
-                <a:cs typeface="Verdana" panose="020B0604030504040204"/>
-              </a:rPr>
-              <a:t> </a:t>
-            </a:r>
-            <a:r>
-              <a:rPr sz="3950" spc="55" dirty="0">
-                <a:latin typeface="Verdana" panose="020B0604030504040204"/>
-                <a:cs typeface="Verdana" panose="020B0604030504040204"/>
-              </a:rPr>
-              <a:t>inspect</a:t>
-            </a:r>
-            <a:r>
-              <a:rPr sz="3950" spc="-204" dirty="0">
-                <a:latin typeface="Verdana" panose="020B0604030504040204"/>
-                <a:cs typeface="Verdana" panose="020B0604030504040204"/>
-              </a:rPr>
-              <a:t> </a:t>
-            </a:r>
-            <a:r>
-              <a:rPr sz="3950" spc="-254" dirty="0">
-                <a:latin typeface="Verdana" panose="020B0604030504040204"/>
-                <a:cs typeface="Verdana" panose="020B0604030504040204"/>
-              </a:rPr>
-              <a:t>&lt;pid&gt;|</a:t>
-            </a:r>
-            <a:r>
-              <a:rPr sz="3950" spc="-204" dirty="0">
-                <a:latin typeface="Verdana" panose="020B0604030504040204"/>
-                <a:cs typeface="Verdana" panose="020B0604030504040204"/>
-              </a:rPr>
-              <a:t> </a:t>
-            </a:r>
-            <a:r>
-              <a:rPr sz="3950" spc="70" dirty="0">
-                <a:latin typeface="Verdana" panose="020B0604030504040204"/>
-                <a:cs typeface="Verdana" panose="020B0604030504040204"/>
-              </a:rPr>
-              <a:t>grep</a:t>
-            </a:r>
-            <a:r>
-              <a:rPr sz="3950" spc="-204" dirty="0">
-                <a:latin typeface="Verdana" panose="020B0604030504040204"/>
-                <a:cs typeface="Verdana" panose="020B0604030504040204"/>
-              </a:rPr>
-              <a:t> </a:t>
-            </a:r>
-            <a:r>
-              <a:rPr sz="3950" spc="25" dirty="0">
-                <a:latin typeface="Verdana" panose="020B0604030504040204"/>
-                <a:cs typeface="Verdana" panose="020B0604030504040204"/>
-              </a:rPr>
-              <a:t>“IPAddress"</a:t>
-            </a:r>
-            <a:endParaRPr sz="3950">
-              <a:latin typeface="Verdana" panose="020B0604030504040204"/>
-              <a:cs typeface="Verdana" panose="020B0604030504040204"/>
-            </a:endParaRPr>
-          </a:p>
-        </p:txBody>
-      </p:sp>
-      <p:sp>
-        <p:nvSpPr>
-          <p:cNvPr id="6" name="Slide Number Placeholder 5"/>
+          <p:cNvPr id="5" name="Slide Number Placeholder 4"/>
           <p:cNvSpPr>
             <a:spLocks noGrp="1"/>
           </p:cNvSpPr>
@@ -4666,379 +4178,6 @@
 </file>
 
 <file path=ppt/slides/slide6.xml><?xml version="1.0" encoding="utf-8"?>
-<p:sld xmlns:a="http://schemas.openxmlformats.org/drawingml/2006/main" xmlns:r="http://schemas.openxmlformats.org/officeDocument/2006/relationships" xmlns:p="http://schemas.openxmlformats.org/presentationml/2006/main" showMasterSp="0">
-  <p:cSld>
-    <p:spTree>
-      <p:nvGrpSpPr>
-        <p:cNvPr id="1" name=""/>
-        <p:cNvGrpSpPr/>
-        <p:nvPr/>
-      </p:nvGrpSpPr>
-      <p:grpSpPr>
-        <a:xfrm>
-          <a:off x="0" y="0"/>
-          <a:ext cx="0" cy="0"/>
-          <a:chOff x="0" y="0"/>
-          <a:chExt cx="0" cy="0"/>
-        </a:xfrm>
-      </p:grpSpPr>
-      <p:sp>
-        <p:nvSpPr>
-          <p:cNvPr id="2" name="object 2"/>
-          <p:cNvSpPr/>
-          <p:nvPr/>
-        </p:nvSpPr>
-        <p:spPr>
-          <a:xfrm>
-            <a:off x="597688" y="6340484"/>
-            <a:ext cx="18664555" cy="6985"/>
-          </a:xfrm>
-          <a:custGeom>
-            <a:avLst/>
-            <a:gdLst/>
-            <a:ahLst/>
-            <a:cxnLst/>
-            <a:rect l="l" t="t" r="r" b="b"/>
-            <a:pathLst>
-              <a:path w="18664555" h="6985">
-                <a:moveTo>
-                  <a:pt x="18664217" y="0"/>
-                </a:moveTo>
-                <a:lnTo>
-                  <a:pt x="0" y="6789"/>
-                </a:lnTo>
-              </a:path>
-            </a:pathLst>
-          </a:custGeom>
-          <a:ln w="31412">
-            <a:solidFill>
-              <a:srgbClr val="E5E5E5"/>
-            </a:solidFill>
-          </a:ln>
-        </p:spPr>
-        <p:txBody>
-          <a:bodyPr wrap="square" lIns="0" tIns="0" rIns="0" bIns="0" rtlCol="0"/>
-          <a:lstStyle/>
-          <a:p/>
-        </p:txBody>
-      </p:sp>
-      <p:sp>
-        <p:nvSpPr>
-          <p:cNvPr id="3" name="object 3"/>
-          <p:cNvSpPr txBox="1">
-            <a:spLocks noGrp="1"/>
-          </p:cNvSpPr>
-          <p:nvPr>
-            <p:ph type="title"/>
-          </p:nvPr>
-        </p:nvSpPr>
-        <p:spPr>
-          <a:prstGeom prst="rect">
-            <a:avLst/>
-          </a:prstGeom>
-        </p:spPr>
-        <p:txBody>
-          <a:bodyPr vert="horz" wrap="square" lIns="0" tIns="13335" rIns="0" bIns="0" rtlCol="0">
-            <a:spAutoFit/>
-          </a:bodyPr>
-          <a:lstStyle/>
-          <a:p>
-            <a:pPr marL="12700">
-              <a:lnSpc>
-                <a:spcPct val="100000"/>
-              </a:lnSpc>
-              <a:spcBef>
-                <a:spcPts val="105"/>
-              </a:spcBef>
-            </a:pPr>
-            <a:r>
-              <a:rPr dirty="0"/>
-              <a:t>&lt;dependency&gt;</a:t>
-            </a:r>
-            <a:endParaRPr dirty="0"/>
-          </a:p>
-        </p:txBody>
-      </p:sp>
-      <p:sp>
-        <p:nvSpPr>
-          <p:cNvPr id="4" name="object 4"/>
-          <p:cNvSpPr txBox="1"/>
-          <p:nvPr/>
-        </p:nvSpPr>
-        <p:spPr>
-          <a:xfrm>
-            <a:off x="1076565" y="3388243"/>
-            <a:ext cx="17590770" cy="5721985"/>
-          </a:xfrm>
-          <a:prstGeom prst="rect">
-            <a:avLst/>
-          </a:prstGeom>
-        </p:spPr>
-        <p:txBody>
-          <a:bodyPr vert="horz" wrap="square" lIns="0" tIns="13335" rIns="0" bIns="0" rtlCol="0">
-            <a:spAutoFit/>
-          </a:bodyPr>
-          <a:lstStyle/>
-          <a:p>
-            <a:pPr marL="1591310">
-              <a:lnSpc>
-                <a:spcPct val="100000"/>
-              </a:lnSpc>
-              <a:spcBef>
-                <a:spcPts val="105"/>
-              </a:spcBef>
-            </a:pPr>
-            <a:r>
-              <a:rPr sz="3950" spc="-5" dirty="0">
-                <a:latin typeface="Courier New" panose="02070309020205020404"/>
-                <a:cs typeface="Courier New" panose="02070309020205020404"/>
-              </a:rPr>
-              <a:t>&lt;groupId&gt;org.springframework.boot&lt;/groupId&gt;</a:t>
-            </a:r>
-            <a:endParaRPr sz="3950">
-              <a:latin typeface="Courier New" panose="02070309020205020404"/>
-              <a:cs typeface="Courier New" panose="02070309020205020404"/>
-            </a:endParaRPr>
-          </a:p>
-          <a:p>
-            <a:pPr marL="1591310">
-              <a:lnSpc>
-                <a:spcPct val="100000"/>
-              </a:lnSpc>
-              <a:spcBef>
-                <a:spcPts val="210"/>
-              </a:spcBef>
-            </a:pPr>
-            <a:r>
-              <a:rPr sz="3950" dirty="0">
-                <a:latin typeface="Courier New" panose="02070309020205020404"/>
-                <a:cs typeface="Courier New" panose="02070309020205020404"/>
-              </a:rPr>
-              <a:t>&lt;artifactId&gt;spring-boot-starter-data-jpa&lt;/artifactId&gt;</a:t>
-            </a:r>
-            <a:endParaRPr sz="3950">
-              <a:latin typeface="Courier New" panose="02070309020205020404"/>
-              <a:cs typeface="Courier New" panose="02070309020205020404"/>
-            </a:endParaRPr>
-          </a:p>
-          <a:p>
-            <a:pPr marL="83820">
-              <a:lnSpc>
-                <a:spcPct val="100000"/>
-              </a:lnSpc>
-              <a:spcBef>
-                <a:spcPts val="205"/>
-              </a:spcBef>
-            </a:pPr>
-            <a:r>
-              <a:rPr sz="3950" dirty="0">
-                <a:latin typeface="Courier New" panose="02070309020205020404"/>
-                <a:cs typeface="Courier New" panose="02070309020205020404"/>
-              </a:rPr>
-              <a:t>&lt;/dependency&gt;</a:t>
-            </a:r>
-            <a:endParaRPr sz="3950">
-              <a:latin typeface="Courier New" panose="02070309020205020404"/>
-              <a:cs typeface="Courier New" panose="02070309020205020404"/>
-            </a:endParaRPr>
-          </a:p>
-          <a:p>
-            <a:pPr>
-              <a:lnSpc>
-                <a:spcPct val="100000"/>
-              </a:lnSpc>
-            </a:pPr>
-            <a:endParaRPr sz="5200">
-              <a:latin typeface="Courier New" panose="02070309020205020404"/>
-              <a:cs typeface="Courier New" panose="02070309020205020404"/>
-            </a:endParaRPr>
-          </a:p>
-          <a:p>
-            <a:pPr>
-              <a:lnSpc>
-                <a:spcPct val="100000"/>
-              </a:lnSpc>
-              <a:spcBef>
-                <a:spcPts val="10"/>
-              </a:spcBef>
-            </a:pPr>
-            <a:endParaRPr sz="4950">
-              <a:latin typeface="Courier New" panose="02070309020205020404"/>
-              <a:cs typeface="Courier New" panose="02070309020205020404"/>
-            </a:endParaRPr>
-          </a:p>
-          <a:p>
-            <a:pPr marL="12700">
-              <a:lnSpc>
-                <a:spcPct val="100000"/>
-              </a:lnSpc>
-              <a:spcBef>
-                <a:spcPts val="5"/>
-              </a:spcBef>
-            </a:pPr>
-            <a:r>
-              <a:rPr sz="5900" spc="165" dirty="0">
-                <a:solidFill>
-                  <a:srgbClr val="404040"/>
-                </a:solidFill>
-                <a:latin typeface="Verdana" panose="020B0604030504040204"/>
-                <a:cs typeface="Verdana" panose="020B0604030504040204"/>
-              </a:rPr>
-              <a:t>Adding</a:t>
-            </a:r>
-            <a:r>
-              <a:rPr sz="5900" spc="-310" dirty="0">
-                <a:solidFill>
-                  <a:srgbClr val="404040"/>
-                </a:solidFill>
-                <a:latin typeface="Verdana" panose="020B0604030504040204"/>
-                <a:cs typeface="Verdana" panose="020B0604030504040204"/>
-              </a:rPr>
-              <a:t> </a:t>
-            </a:r>
-            <a:r>
-              <a:rPr sz="5900" spc="40" dirty="0">
-                <a:solidFill>
-                  <a:srgbClr val="404040"/>
-                </a:solidFill>
-                <a:latin typeface="Verdana" panose="020B0604030504040204"/>
-                <a:cs typeface="Verdana" panose="020B0604030504040204"/>
-              </a:rPr>
-              <a:t>Jars</a:t>
-            </a:r>
-            <a:r>
-              <a:rPr sz="5900" spc="-305" dirty="0">
-                <a:solidFill>
-                  <a:srgbClr val="404040"/>
-                </a:solidFill>
-                <a:latin typeface="Verdana" panose="020B0604030504040204"/>
-                <a:cs typeface="Verdana" panose="020B0604030504040204"/>
-              </a:rPr>
-              <a:t> </a:t>
-            </a:r>
-            <a:r>
-              <a:rPr sz="5900" spc="20" dirty="0">
-                <a:solidFill>
-                  <a:srgbClr val="404040"/>
-                </a:solidFill>
-                <a:latin typeface="Verdana" panose="020B0604030504040204"/>
-                <a:cs typeface="Verdana" panose="020B0604030504040204"/>
-              </a:rPr>
-              <a:t>with</a:t>
-            </a:r>
-            <a:r>
-              <a:rPr sz="5900" spc="-305" dirty="0">
-                <a:solidFill>
-                  <a:srgbClr val="404040"/>
-                </a:solidFill>
-                <a:latin typeface="Verdana" panose="020B0604030504040204"/>
-                <a:cs typeface="Verdana" panose="020B0604030504040204"/>
-              </a:rPr>
-              <a:t> </a:t>
-            </a:r>
-            <a:r>
-              <a:rPr sz="5900" spc="-90" dirty="0">
-                <a:solidFill>
-                  <a:srgbClr val="404040"/>
-                </a:solidFill>
-                <a:latin typeface="Verdana" panose="020B0604030504040204"/>
-                <a:cs typeface="Verdana" panose="020B0604030504040204"/>
-              </a:rPr>
-              <a:t>Maven</a:t>
-            </a:r>
-            <a:endParaRPr sz="5900">
-              <a:latin typeface="Verdana" panose="020B0604030504040204"/>
-              <a:cs typeface="Verdana" panose="020B0604030504040204"/>
-            </a:endParaRPr>
-          </a:p>
-          <a:p>
-            <a:pPr marL="48895">
-              <a:lnSpc>
-                <a:spcPct val="100000"/>
-              </a:lnSpc>
-              <a:spcBef>
-                <a:spcPts val="1130"/>
-              </a:spcBef>
-            </a:pPr>
-            <a:r>
-              <a:rPr sz="3100" spc="25" dirty="0">
-                <a:latin typeface="Verdana" panose="020B0604030504040204"/>
-                <a:cs typeface="Verdana" panose="020B0604030504040204"/>
-              </a:rPr>
-              <a:t>Version</a:t>
-            </a:r>
-            <a:endParaRPr sz="3100">
-              <a:latin typeface="Verdana" panose="020B0604030504040204"/>
-              <a:cs typeface="Verdana" panose="020B0604030504040204"/>
-            </a:endParaRPr>
-          </a:p>
-          <a:p>
-            <a:pPr marL="48895">
-              <a:lnSpc>
-                <a:spcPct val="100000"/>
-              </a:lnSpc>
-              <a:spcBef>
-                <a:spcPts val="3040"/>
-              </a:spcBef>
-            </a:pPr>
-            <a:r>
-              <a:rPr sz="3100" spc="-20" dirty="0">
-                <a:latin typeface="Verdana" panose="020B0604030504040204"/>
-                <a:cs typeface="Verdana" panose="020B0604030504040204"/>
-              </a:rPr>
-              <a:t>Transitive</a:t>
-            </a:r>
-            <a:r>
-              <a:rPr sz="3100" spc="-165" dirty="0">
-                <a:latin typeface="Verdana" panose="020B0604030504040204"/>
-                <a:cs typeface="Verdana" panose="020B0604030504040204"/>
-              </a:rPr>
-              <a:t> </a:t>
-            </a:r>
-            <a:r>
-              <a:rPr sz="3100" spc="55" dirty="0">
-                <a:latin typeface="Verdana" panose="020B0604030504040204"/>
-                <a:cs typeface="Verdana" panose="020B0604030504040204"/>
-              </a:rPr>
-              <a:t>Dependencies</a:t>
-            </a:r>
-            <a:endParaRPr sz="3100">
-              <a:latin typeface="Verdana" panose="020B0604030504040204"/>
-              <a:cs typeface="Verdana" panose="020B0604030504040204"/>
-            </a:endParaRPr>
-          </a:p>
-        </p:txBody>
-      </p:sp>
-      <p:sp>
-        <p:nvSpPr>
-          <p:cNvPr id="5" name="Slide Number Placeholder 4"/>
-          <p:cNvSpPr>
-            <a:spLocks noGrp="1"/>
-          </p:cNvSpPr>
-          <p:nvPr>
-            <p:ph type="sldNum" sz="quarter" idx="7"/>
-          </p:nvPr>
-        </p:nvSpPr>
-        <p:spPr/>
-        <p:txBody>
-          <a:bodyPr/>
-          <a:p>
-            <a:fld id="{B6F15528-21DE-4FAA-801E-634DDDAF4B2B}" type="slidenum">
-              <a:rPr/>
-            </a:fld>
-            <a:endParaRPr/>
-          </a:p>
-        </p:txBody>
-      </p:sp>
-    </p:spTree>
-  </p:cSld>
-  <p:clrMapOvr>
-    <a:masterClrMapping/>
-  </p:clrMapOvr>
-</p:sld>
-</file>
-
-<file path=ppt/slides/slide7.xml><?xml version="1.0" encoding="utf-8"?>
 <p:sld xmlns:a="http://schemas.openxmlformats.org/drawingml/2006/main" xmlns:r="http://schemas.openxmlformats.org/officeDocument/2006/relationships" xmlns:p="http://schemas.openxmlformats.org/presentationml/2006/main" showMasterSp="0">
   <p:cSld>
     <p:spTree>
@@ -5115,8 +4254,8 @@
         </p:nvSpPr>
         <p:spPr>
           <a:xfrm>
-            <a:off x="7178662" y="795651"/>
-            <a:ext cx="5747385" cy="930275"/>
+            <a:off x="5899664" y="795651"/>
+            <a:ext cx="8305165" cy="930275"/>
           </a:xfrm>
           <a:prstGeom prst="rect">
             <a:avLst/>
@@ -5137,14 +4276,14 @@
               </a:spcBef>
             </a:pPr>
             <a:r>
-              <a:rPr sz="5900" spc="-110" dirty="0">
+              <a:rPr sz="5900" spc="25" dirty="0">
                 <a:solidFill>
                   <a:srgbClr val="404040"/>
                 </a:solidFill>
                 <a:latin typeface="Verdana" panose="020B0604030504040204"/>
                 <a:cs typeface="Verdana" panose="020B0604030504040204"/>
               </a:rPr>
-              <a:t>persistence.xml</a:t>
+              <a:t>EntityManagerFactory</a:t>
             </a:r>
             <a:endParaRPr sz="5900">
               <a:latin typeface="Verdana" panose="020B0604030504040204"/>
@@ -5161,62 +4300,146 @@
         </p:nvSpPr>
         <p:spPr>
           <a:xfrm>
-            <a:off x="1147710" y="3359061"/>
-            <a:ext cx="16878300" cy="4423410"/>
+            <a:off x="1227702" y="2333156"/>
+            <a:ext cx="14010640" cy="7685405"/>
           </a:xfrm>
           <a:prstGeom prst="rect">
             <a:avLst/>
           </a:prstGeom>
         </p:spPr>
         <p:txBody>
-          <a:bodyPr vert="horz" wrap="square" lIns="0" tIns="114935" rIns="0" bIns="0" rtlCol="0">
+          <a:bodyPr vert="horz" wrap="square" lIns="0" tIns="12065" rIns="0" bIns="0" rtlCol="0">
             <a:spAutoFit/>
           </a:bodyPr>
           <a:lstStyle/>
           <a:p>
-            <a:pPr marL="12700">
+            <a:pPr marL="12700" marR="1322070">
+              <a:lnSpc>
+                <a:spcPct val="120000"/>
+              </a:lnSpc>
+              <a:spcBef>
+                <a:spcPts val="95"/>
+              </a:spcBef>
+            </a:pPr>
+            <a:r>
+              <a:rPr sz="3450" dirty="0">
+                <a:latin typeface="Courier New" panose="02070309020205020404"/>
+                <a:cs typeface="Courier New" panose="02070309020205020404"/>
+              </a:rPr>
+              <a:t>EntityManagerFactory</a:t>
+            </a:r>
+            <a:r>
+              <a:rPr sz="3450" spc="5" dirty="0">
+                <a:latin typeface="Courier New" panose="02070309020205020404"/>
+                <a:cs typeface="Courier New" panose="02070309020205020404"/>
+              </a:rPr>
+              <a:t> </a:t>
+            </a:r>
+            <a:r>
+              <a:rPr sz="3450" dirty="0">
+                <a:latin typeface="Courier New" panose="02070309020205020404"/>
+                <a:cs typeface="Courier New" panose="02070309020205020404"/>
+              </a:rPr>
+              <a:t>entityManagerFactory</a:t>
+            </a:r>
+            <a:r>
+              <a:rPr sz="3450" spc="10" dirty="0">
+                <a:latin typeface="Courier New" panose="02070309020205020404"/>
+                <a:cs typeface="Courier New" panose="02070309020205020404"/>
+              </a:rPr>
+              <a:t> </a:t>
+            </a:r>
+            <a:r>
+              <a:rPr sz="3450" spc="5" dirty="0">
+                <a:latin typeface="Courier New" panose="02070309020205020404"/>
+                <a:cs typeface="Courier New" panose="02070309020205020404"/>
+              </a:rPr>
+              <a:t>= </a:t>
+            </a:r>
+            <a:r>
+              <a:rPr sz="3450" spc="10" dirty="0">
+                <a:latin typeface="Courier New" panose="02070309020205020404"/>
+                <a:cs typeface="Courier New" panose="02070309020205020404"/>
+              </a:rPr>
+              <a:t> </a:t>
+            </a:r>
+            <a:r>
+              <a:rPr sz="3450" spc="5" dirty="0">
+                <a:latin typeface="Courier New" panose="02070309020205020404"/>
+                <a:cs typeface="Courier New" panose="02070309020205020404"/>
+              </a:rPr>
+              <a:t>Persistence.createEntityManagerFactory("PUNIT"); </a:t>
+            </a:r>
+            <a:r>
+              <a:rPr sz="3450" spc="-2060" dirty="0">
+                <a:latin typeface="Courier New" panose="02070309020205020404"/>
+                <a:cs typeface="Courier New" panose="02070309020205020404"/>
+              </a:rPr>
+              <a:t> </a:t>
+            </a:r>
+            <a:r>
+              <a:rPr sz="3450" dirty="0">
+                <a:latin typeface="Courier New" panose="02070309020205020404"/>
+                <a:cs typeface="Courier New" panose="02070309020205020404"/>
+              </a:rPr>
+              <a:t>EntityManager entityManager</a:t>
+            </a:r>
+            <a:r>
+              <a:rPr sz="3450" spc="5" dirty="0">
+                <a:latin typeface="Courier New" panose="02070309020205020404"/>
+                <a:cs typeface="Courier New" panose="02070309020205020404"/>
+              </a:rPr>
+              <a:t> = </a:t>
+            </a:r>
+            <a:r>
+              <a:rPr sz="3450" spc="10" dirty="0">
+                <a:latin typeface="Courier New" panose="02070309020205020404"/>
+                <a:cs typeface="Courier New" panose="02070309020205020404"/>
+              </a:rPr>
+              <a:t> </a:t>
+            </a:r>
+            <a:r>
+              <a:rPr sz="3450" spc="5" dirty="0">
+                <a:latin typeface="Courier New" panose="02070309020205020404"/>
+                <a:cs typeface="Courier New" panose="02070309020205020404"/>
+              </a:rPr>
+              <a:t>entityManagerFactory.createEntityManager(); </a:t>
+            </a:r>
+            <a:r>
+              <a:rPr sz="3450" spc="10" dirty="0">
+                <a:latin typeface="Courier New" panose="02070309020205020404"/>
+                <a:cs typeface="Courier New" panose="02070309020205020404"/>
+              </a:rPr>
+              <a:t> </a:t>
+            </a:r>
+            <a:r>
+              <a:rPr sz="3450" spc="5" dirty="0">
+                <a:latin typeface="Courier New" panose="02070309020205020404"/>
+                <a:cs typeface="Courier New" panose="02070309020205020404"/>
+              </a:rPr>
+              <a:t>entityManager.getTransaction().begin();</a:t>
+            </a:r>
+            <a:endParaRPr sz="3450">
+              <a:latin typeface="Courier New" panose="02070309020205020404"/>
+              <a:cs typeface="Courier New" panose="02070309020205020404"/>
+            </a:endParaRPr>
+          </a:p>
+          <a:p>
+            <a:pPr>
               <a:lnSpc>
                 <a:spcPct val="100000"/>
               </a:lnSpc>
               <a:spcBef>
-                <a:spcPts val="905"/>
+                <a:spcPts val="20"/>
               </a:spcBef>
             </a:pPr>
-            <a:r>
-              <a:rPr sz="3450" dirty="0">
-                <a:latin typeface="Courier New" panose="02070309020205020404"/>
-                <a:cs typeface="Courier New" panose="02070309020205020404"/>
-              </a:rPr>
-              <a:t>&lt;?xml</a:t>
-            </a:r>
-            <a:r>
-              <a:rPr sz="3450" spc="5" dirty="0">
-                <a:latin typeface="Courier New" panose="02070309020205020404"/>
-                <a:cs typeface="Courier New" panose="02070309020205020404"/>
-              </a:rPr>
-              <a:t> </a:t>
-            </a:r>
-            <a:r>
-              <a:rPr sz="3450" dirty="0">
-                <a:latin typeface="Courier New" panose="02070309020205020404"/>
-                <a:cs typeface="Courier New" panose="02070309020205020404"/>
-              </a:rPr>
-              <a:t>version="1.0"</a:t>
-            </a:r>
-            <a:r>
-              <a:rPr sz="3450" spc="5" dirty="0">
-                <a:latin typeface="Courier New" panose="02070309020205020404"/>
-                <a:cs typeface="Courier New" panose="02070309020205020404"/>
-              </a:rPr>
-              <a:t> encoding="UTF-8"?&gt;</a:t>
-            </a:r>
-            <a:endParaRPr sz="3450">
+            <a:endParaRPr sz="4350">
               <a:latin typeface="Courier New" panose="02070309020205020404"/>
               <a:cs typeface="Courier New" panose="02070309020205020404"/>
             </a:endParaRPr>
           </a:p>
           <a:p>
-            <a:pPr marL="1068070" marR="3399790" indent="-1056005">
+            <a:pPr marL="12700" marR="5080">
               <a:lnSpc>
                 <a:spcPct val="120000"/>
               </a:lnSpc>
@@ -5226,14 +4449,108 @@
                 <a:latin typeface="Courier New" panose="02070309020205020404"/>
                 <a:cs typeface="Courier New" panose="02070309020205020404"/>
               </a:rPr>
-              <a:t>&lt;persistence </a:t>
+              <a:t>Registration</a:t>
+            </a:r>
+            <a:r>
+              <a:rPr sz="3450" spc="10" dirty="0">
+                <a:latin typeface="Courier New" panose="02070309020205020404"/>
+                <a:cs typeface="Courier New" panose="02070309020205020404"/>
+              </a:rPr>
+              <a:t> </a:t>
+            </a:r>
+            <a:r>
+              <a:rPr sz="3450" dirty="0">
+                <a:latin typeface="Courier New" panose="02070309020205020404"/>
+                <a:cs typeface="Courier New" panose="02070309020205020404"/>
+              </a:rPr>
+              <a:t>reg</a:t>
+            </a:r>
+            <a:r>
+              <a:rPr sz="3450" spc="15" dirty="0">
+                <a:latin typeface="Courier New" panose="02070309020205020404"/>
+                <a:cs typeface="Courier New" panose="02070309020205020404"/>
+              </a:rPr>
+              <a:t> </a:t>
             </a:r>
             <a:r>
               <a:rPr sz="3450" spc="5" dirty="0">
                 <a:latin typeface="Courier New" panose="02070309020205020404"/>
                 <a:cs typeface="Courier New" panose="02070309020205020404"/>
               </a:rPr>
-              <a:t>version="2.1" </a:t>
+              <a:t>=</a:t>
+            </a:r>
+            <a:r>
+              <a:rPr sz="3450" spc="15" dirty="0">
+                <a:latin typeface="Courier New" panose="02070309020205020404"/>
+                <a:cs typeface="Courier New" panose="02070309020205020404"/>
+              </a:rPr>
+              <a:t> </a:t>
+            </a:r>
+            <a:r>
+              <a:rPr sz="3450" dirty="0">
+                <a:latin typeface="Courier New" panose="02070309020205020404"/>
+                <a:cs typeface="Courier New" panose="02070309020205020404"/>
+              </a:rPr>
+              <a:t>new</a:t>
+            </a:r>
+            <a:r>
+              <a:rPr sz="3450" spc="15" dirty="0">
+                <a:latin typeface="Courier New" panose="02070309020205020404"/>
+                <a:cs typeface="Courier New" panose="02070309020205020404"/>
+              </a:rPr>
+              <a:t> </a:t>
+            </a:r>
+            <a:r>
+              <a:rPr sz="3450" dirty="0">
+                <a:latin typeface="Courier New" panose="02070309020205020404"/>
+                <a:cs typeface="Courier New" panose="02070309020205020404"/>
+              </a:rPr>
+              <a:t>Registration("Bob",</a:t>
+            </a:r>
+            <a:r>
+              <a:rPr sz="3450" spc="15" dirty="0">
+                <a:latin typeface="Courier New" panose="02070309020205020404"/>
+                <a:cs typeface="Courier New" panose="02070309020205020404"/>
+              </a:rPr>
+              <a:t> </a:t>
+            </a:r>
+            <a:r>
+              <a:rPr sz="3450" dirty="0">
+                <a:latin typeface="Courier New" panose="02070309020205020404"/>
+                <a:cs typeface="Courier New" panose="02070309020205020404"/>
+              </a:rPr>
+              <a:t>"Builder", </a:t>
+            </a:r>
+            <a:r>
+              <a:rPr sz="3450" spc="-2055" dirty="0">
+                <a:latin typeface="Courier New" panose="02070309020205020404"/>
+                <a:cs typeface="Courier New" panose="02070309020205020404"/>
+              </a:rPr>
+              <a:t> </a:t>
+            </a:r>
+            <a:r>
+              <a:rPr sz="3450" spc="5" dirty="0">
+                <a:latin typeface="Courier New" panose="02070309020205020404"/>
+                <a:cs typeface="Courier New" panose="02070309020205020404"/>
+                <a:hlinkClick r:id="rId1"/>
+              </a:rPr>
+              <a:t>"bobthebuilder@</a:t>
+            </a:r>
+            <a:r>
+              <a:rPr lang="en-US" sz="3450" spc="5" dirty="0">
+                <a:latin typeface="Courier New" panose="02070309020205020404"/>
+                <a:cs typeface="Courier New" panose="02070309020205020404"/>
+                <a:hlinkClick r:id="rId1"/>
+              </a:rPr>
+              <a:t>mycompany</a:t>
+            </a:r>
+            <a:r>
+              <a:rPr sz="3450" spc="5" dirty="0">
+                <a:latin typeface="Courier New" panose="02070309020205020404"/>
+                <a:cs typeface="Courier New" panose="02070309020205020404"/>
+                <a:hlinkClick r:id="rId1"/>
+              </a:rPr>
+              <a:t>.com"); </a:t>
             </a:r>
             <a:r>
               <a:rPr sz="3450" spc="10" dirty="0">
@@ -5243,38 +4560,25 @@
               <a:t> </a:t>
             </a:r>
             <a:r>
-              <a:rPr sz="3450" dirty="0">
-                <a:latin typeface="Courier New" panose="02070309020205020404"/>
-                <a:cs typeface="Courier New" panose="02070309020205020404"/>
-                <a:hlinkClick r:id="rId1"/>
-              </a:rPr>
-              <a:t>xmlns="http://xmlns.jcp.org/xml/ns/persistence"</a:t>
-            </a:r>
-            <a:endParaRPr sz="3450">
-              <a:latin typeface="Courier New" panose="02070309020205020404"/>
-              <a:cs typeface="Courier New" panose="02070309020205020404"/>
-            </a:endParaRPr>
-          </a:p>
-          <a:p>
-            <a:pPr marL="1068070" marR="233680" indent="-302260">
-              <a:lnSpc>
-                <a:spcPct val="120000"/>
-              </a:lnSpc>
-            </a:pPr>
-            <a:r>
               <a:rPr sz="3450" spc="5" dirty="0">
                 <a:latin typeface="Courier New" panose="02070309020205020404"/>
                 <a:cs typeface="Courier New" panose="02070309020205020404"/>
-                <a:hlinkClick r:id="rId2"/>
-              </a:rPr>
-              <a:t>xmlns:xsi="http://www.w3.org/2001/XMLSchema-</a:t>
+              </a:rPr>
+              <a:t>entityManager.persist(reg); </a:t>
+            </a:r>
+            <a:r>
+              <a:rPr sz="3450" spc="10" dirty="0">
+                <a:latin typeface="Courier New" panose="02070309020205020404"/>
+                <a:cs typeface="Courier New" panose="02070309020205020404"/>
+              </a:rPr>
+              <a:t> </a:t>
             </a:r>
             <a:r>
               <a:rPr sz="3450" spc="5" dirty="0">
                 <a:latin typeface="Courier New" panose="02070309020205020404"/>
                 <a:cs typeface="Courier New" panose="02070309020205020404"/>
               </a:rPr>
-              <a:t>instance" </a:t>
+              <a:t>entityManager.getTransaction().commit(); </a:t>
             </a:r>
             <a:r>
               <a:rPr sz="3450" spc="10" dirty="0">
@@ -5284,34 +4588,11 @@
               <a:t> </a:t>
             </a:r>
             <a:r>
-              <a:rPr sz="3450" dirty="0">
-                <a:latin typeface="Courier New" panose="02070309020205020404"/>
-                <a:cs typeface="Courier New" panose="02070309020205020404"/>
-                <a:hlinkClick r:id="rId1"/>
-              </a:rPr>
-              <a:t>xsi:schemaLocation="http://xmlns.jcp.org/xml/ns/persistence</a:t>
-            </a:r>
-            <a:endParaRPr sz="3450">
-              <a:latin typeface="Courier New" panose="02070309020205020404"/>
-              <a:cs typeface="Courier New" panose="02070309020205020404"/>
-            </a:endParaRPr>
-          </a:p>
-          <a:p>
-            <a:pPr marL="766445">
-              <a:lnSpc>
-                <a:spcPct val="100000"/>
-              </a:lnSpc>
-              <a:spcBef>
-                <a:spcPts val="805"/>
-              </a:spcBef>
-            </a:pPr>
-            <a:r>
               <a:rPr sz="3450" spc="5" dirty="0">
                 <a:latin typeface="Courier New" panose="02070309020205020404"/>
                 <a:cs typeface="Courier New" panose="02070309020205020404"/>
-                <a:hlinkClick r:id="rId3"/>
-              </a:rPr>
-              <a:t>http://xmlns.jcp.org/xml/ns/persistence/persistence_2_1.xsd"&gt;</a:t>
+              </a:rPr>
+              <a:t>entityManager.close();</a:t>
             </a:r>
             <a:endParaRPr sz="3450">
               <a:latin typeface="Courier New" panose="02070309020205020404"/>
@@ -5332,11 +4613,360 @@
                 <a:latin typeface="Courier New" panose="02070309020205020404"/>
                 <a:cs typeface="Courier New" panose="02070309020205020404"/>
               </a:rPr>
-              <a:t>//…</a:t>
+              <a:t>entityManagerFactory.close();</a:t>
             </a:r>
             <a:endParaRPr sz="3450">
               <a:latin typeface="Courier New" panose="02070309020205020404"/>
               <a:cs typeface="Courier New" panose="02070309020205020404"/>
+            </a:endParaRPr>
+          </a:p>
+        </p:txBody>
+      </p:sp>
+      <p:sp>
+        <p:nvSpPr>
+          <p:cNvPr id="5" name="Slide Number Placeholder 4"/>
+          <p:cNvSpPr>
+            <a:spLocks noGrp="1"/>
+          </p:cNvSpPr>
+          <p:nvPr>
+            <p:ph type="sldNum" sz="quarter" idx="7"/>
+          </p:nvPr>
+        </p:nvSpPr>
+        <p:spPr/>
+        <p:txBody>
+          <a:bodyPr/>
+          <a:p>
+            <a:fld id="{B6F15528-21DE-4FAA-801E-634DDDAF4B2B}" type="slidenum">
+              <a:rPr/>
+            </a:fld>
+            <a:endParaRPr/>
+          </a:p>
+        </p:txBody>
+      </p:sp>
+    </p:spTree>
+  </p:cSld>
+  <p:clrMapOvr>
+    <a:masterClrMapping/>
+  </p:clrMapOvr>
+</p:sld>
+</file>
+
+<file path=ppt/slides/slide7.xml><?xml version="1.0" encoding="utf-8"?>
+<p:sld xmlns:a="http://schemas.openxmlformats.org/drawingml/2006/main" xmlns:r="http://schemas.openxmlformats.org/officeDocument/2006/relationships" xmlns:p="http://schemas.openxmlformats.org/presentationml/2006/main" showMasterSp="0">
+  <p:cSld>
+    <p:spTree>
+      <p:nvGrpSpPr>
+        <p:cNvPr id="1" name=""/>
+        <p:cNvGrpSpPr/>
+        <p:nvPr/>
+      </p:nvGrpSpPr>
+      <p:grpSpPr>
+        <a:xfrm>
+          <a:off x="0" y="0"/>
+          <a:ext cx="0" cy="0"/>
+          <a:chOff x="0" y="0"/>
+          <a:chExt cx="0" cy="0"/>
+        </a:xfrm>
+      </p:grpSpPr>
+      <p:sp>
+        <p:nvSpPr>
+          <p:cNvPr id="2" name="object 2"/>
+          <p:cNvSpPr/>
+          <p:nvPr/>
+        </p:nvSpPr>
+        <p:spPr>
+          <a:xfrm>
+            <a:off x="597688" y="6340484"/>
+            <a:ext cx="18664555" cy="6985"/>
+          </a:xfrm>
+          <a:custGeom>
+            <a:avLst/>
+            <a:gdLst/>
+            <a:ahLst/>
+            <a:cxnLst/>
+            <a:rect l="l" t="t" r="r" b="b"/>
+            <a:pathLst>
+              <a:path w="18664555" h="6985">
+                <a:moveTo>
+                  <a:pt x="18664217" y="0"/>
+                </a:moveTo>
+                <a:lnTo>
+                  <a:pt x="0" y="6789"/>
+                </a:lnTo>
+              </a:path>
+            </a:pathLst>
+          </a:custGeom>
+          <a:ln w="31412">
+            <a:solidFill>
+              <a:srgbClr val="E5E5E5"/>
+            </a:solidFill>
+          </a:ln>
+        </p:spPr>
+        <p:txBody>
+          <a:bodyPr wrap="square" lIns="0" tIns="0" rIns="0" bIns="0" rtlCol="0"/>
+          <a:lstStyle/>
+          <a:p/>
+        </p:txBody>
+      </p:sp>
+      <p:sp>
+        <p:nvSpPr>
+          <p:cNvPr id="3" name="object 3"/>
+          <p:cNvSpPr txBox="1">
+            <a:spLocks noGrp="1"/>
+          </p:cNvSpPr>
+          <p:nvPr>
+            <p:ph type="title"/>
+          </p:nvPr>
+        </p:nvSpPr>
+        <p:spPr>
+          <a:prstGeom prst="rect">
+            <a:avLst/>
+          </a:prstGeom>
+        </p:spPr>
+        <p:txBody>
+          <a:bodyPr vert="horz" wrap="square" lIns="0" tIns="13335" rIns="0" bIns="0" rtlCol="0">
+            <a:spAutoFit/>
+          </a:bodyPr>
+          <a:lstStyle/>
+          <a:p>
+            <a:pPr marL="12700">
+              <a:lnSpc>
+                <a:spcPct val="100000"/>
+              </a:lnSpc>
+              <a:spcBef>
+                <a:spcPts val="105"/>
+              </a:spcBef>
+            </a:pPr>
+            <a:r>
+              <a:rPr dirty="0"/>
+              <a:t>&lt;dependency&gt;</a:t>
+            </a:r>
+            <a:endParaRPr dirty="0"/>
+          </a:p>
+        </p:txBody>
+      </p:sp>
+      <p:sp>
+        <p:nvSpPr>
+          <p:cNvPr id="4" name="object 4"/>
+          <p:cNvSpPr txBox="1">
+            <a:spLocks noGrp="1"/>
+          </p:cNvSpPr>
+          <p:nvPr>
+            <p:ph type="body" idx="1"/>
+          </p:nvPr>
+        </p:nvSpPr>
+        <p:spPr>
+          <a:prstGeom prst="rect">
+            <a:avLst/>
+          </a:prstGeom>
+        </p:spPr>
+        <p:txBody>
+          <a:bodyPr vert="horz" wrap="square" lIns="0" tIns="13335" rIns="0" bIns="0" rtlCol="0">
+            <a:spAutoFit/>
+          </a:bodyPr>
+          <a:lstStyle/>
+          <a:p>
+            <a:pPr marL="1591310">
+              <a:lnSpc>
+                <a:spcPct val="100000"/>
+              </a:lnSpc>
+              <a:spcBef>
+                <a:spcPts val="105"/>
+              </a:spcBef>
+            </a:pPr>
+            <a:r>
+              <a:rPr spc="-5" dirty="0"/>
+              <a:t>&lt;groupId&gt;mysql&lt;/groupId&gt;</a:t>
+            </a:r>
+            <a:endParaRPr spc="-5" dirty="0"/>
+          </a:p>
+          <a:p>
+            <a:pPr marL="1591310">
+              <a:lnSpc>
+                <a:spcPct val="100000"/>
+              </a:lnSpc>
+              <a:spcBef>
+                <a:spcPts val="210"/>
+              </a:spcBef>
+            </a:pPr>
+            <a:r>
+              <a:rPr dirty="0"/>
+              <a:t>&lt;artifactId&gt;mysql-connector-java&lt;/artifactId&gt;</a:t>
+            </a:r>
+            <a:endParaRPr dirty="0"/>
+          </a:p>
+          <a:p>
+            <a:pPr marL="83820">
+              <a:lnSpc>
+                <a:spcPct val="100000"/>
+              </a:lnSpc>
+              <a:spcBef>
+                <a:spcPts val="205"/>
+              </a:spcBef>
+            </a:pPr>
+            <a:r>
+              <a:rPr dirty="0"/>
+              <a:t>&lt;/dependency&gt;</a:t>
+            </a:r>
+            <a:endParaRPr dirty="0"/>
+          </a:p>
+          <a:p>
+            <a:pPr>
+              <a:lnSpc>
+                <a:spcPct val="100000"/>
+              </a:lnSpc>
+            </a:pPr>
+            <a:endParaRPr sz="5200"/>
+          </a:p>
+          <a:p>
+            <a:pPr>
+              <a:lnSpc>
+                <a:spcPct val="100000"/>
+              </a:lnSpc>
+              <a:spcBef>
+                <a:spcPts val="10"/>
+              </a:spcBef>
+            </a:pPr>
+            <a:endParaRPr sz="4950"/>
+          </a:p>
+          <a:p>
+            <a:pPr marL="12700">
+              <a:lnSpc>
+                <a:spcPct val="100000"/>
+              </a:lnSpc>
+              <a:spcBef>
+                <a:spcPts val="5"/>
+              </a:spcBef>
+            </a:pPr>
+            <a:r>
+              <a:rPr sz="5900" spc="165" dirty="0">
+                <a:solidFill>
+                  <a:srgbClr val="404040"/>
+                </a:solidFill>
+                <a:latin typeface="Verdana" panose="020B0604030504040204"/>
+                <a:cs typeface="Verdana" panose="020B0604030504040204"/>
+              </a:rPr>
+              <a:t>Adding</a:t>
+            </a:r>
+            <a:r>
+              <a:rPr sz="5900" spc="-305" dirty="0">
+                <a:solidFill>
+                  <a:srgbClr val="404040"/>
+                </a:solidFill>
+                <a:latin typeface="Verdana" panose="020B0604030504040204"/>
+                <a:cs typeface="Verdana" panose="020B0604030504040204"/>
+              </a:rPr>
+              <a:t> </a:t>
+            </a:r>
+            <a:r>
+              <a:rPr sz="5900" spc="145" dirty="0">
+                <a:solidFill>
+                  <a:srgbClr val="404040"/>
+                </a:solidFill>
+                <a:latin typeface="Verdana" panose="020B0604030504040204"/>
+                <a:cs typeface="Verdana" panose="020B0604030504040204"/>
+              </a:rPr>
+              <a:t>MySQL</a:t>
+            </a:r>
+            <a:r>
+              <a:rPr sz="5900" spc="-305" dirty="0">
+                <a:solidFill>
+                  <a:srgbClr val="404040"/>
+                </a:solidFill>
+                <a:latin typeface="Verdana" panose="020B0604030504040204"/>
+                <a:cs typeface="Verdana" panose="020B0604030504040204"/>
+              </a:rPr>
+              <a:t> </a:t>
+            </a:r>
+            <a:r>
+              <a:rPr sz="5900" spc="-90" dirty="0">
+                <a:solidFill>
+                  <a:srgbClr val="404040"/>
+                </a:solidFill>
+                <a:latin typeface="Verdana" panose="020B0604030504040204"/>
+                <a:cs typeface="Verdana" panose="020B0604030504040204"/>
+              </a:rPr>
+              <a:t>Maven</a:t>
+            </a:r>
+            <a:r>
+              <a:rPr sz="5900" spc="-305" dirty="0">
+                <a:solidFill>
+                  <a:srgbClr val="404040"/>
+                </a:solidFill>
+                <a:latin typeface="Verdana" panose="020B0604030504040204"/>
+                <a:cs typeface="Verdana" panose="020B0604030504040204"/>
+              </a:rPr>
+              <a:t> </a:t>
+            </a:r>
+            <a:r>
+              <a:rPr sz="5900" spc="50" dirty="0">
+                <a:solidFill>
+                  <a:srgbClr val="404040"/>
+                </a:solidFill>
+                <a:latin typeface="Verdana" panose="020B0604030504040204"/>
+                <a:cs typeface="Verdana" panose="020B0604030504040204"/>
+              </a:rPr>
+              <a:t>Dependency</a:t>
+            </a:r>
+            <a:endParaRPr sz="5900">
+              <a:latin typeface="Verdana" panose="020B0604030504040204"/>
+              <a:cs typeface="Verdana" panose="020B0604030504040204"/>
+            </a:endParaRPr>
+          </a:p>
+          <a:p>
+            <a:pPr marL="48895">
+              <a:lnSpc>
+                <a:spcPct val="100000"/>
+              </a:lnSpc>
+              <a:spcBef>
+                <a:spcPts val="1130"/>
+              </a:spcBef>
+            </a:pPr>
+            <a:r>
+              <a:rPr sz="3100" spc="25" dirty="0">
+                <a:latin typeface="Verdana" panose="020B0604030504040204"/>
+                <a:cs typeface="Verdana" panose="020B0604030504040204"/>
+              </a:rPr>
+              <a:t>Version</a:t>
+            </a:r>
+            <a:endParaRPr sz="3100">
+              <a:latin typeface="Verdana" panose="020B0604030504040204"/>
+              <a:cs typeface="Verdana" panose="020B0604030504040204"/>
+            </a:endParaRPr>
+          </a:p>
+          <a:p>
+            <a:pPr marL="48895">
+              <a:lnSpc>
+                <a:spcPct val="100000"/>
+              </a:lnSpc>
+              <a:spcBef>
+                <a:spcPts val="3040"/>
+              </a:spcBef>
+            </a:pPr>
+            <a:r>
+              <a:rPr sz="3100" spc="-20" dirty="0">
+                <a:latin typeface="Verdana" panose="020B0604030504040204"/>
+                <a:cs typeface="Verdana" panose="020B0604030504040204"/>
+              </a:rPr>
+              <a:t>Transitive</a:t>
+            </a:r>
+            <a:r>
+              <a:rPr sz="3100" spc="-165" dirty="0">
+                <a:latin typeface="Verdana" panose="020B0604030504040204"/>
+                <a:cs typeface="Verdana" panose="020B0604030504040204"/>
+              </a:rPr>
+              <a:t> </a:t>
+            </a:r>
+            <a:r>
+              <a:rPr sz="3100" spc="55" dirty="0">
+                <a:latin typeface="Verdana" panose="020B0604030504040204"/>
+                <a:cs typeface="Verdana" panose="020B0604030504040204"/>
+              </a:rPr>
+              <a:t>Dependencies</a:t>
+            </a:r>
+            <a:endParaRPr sz="3100">
+              <a:latin typeface="Verdana" panose="020B0604030504040204"/>
+              <a:cs typeface="Verdana" panose="020B0604030504040204"/>
             </a:endParaRPr>
           </a:p>
         </p:txBody>
@@ -5371,6 +5001,71 @@
 </file>
 
 <file path=ppt/slides/slide8.xml><?xml version="1.0" encoding="utf-8"?>
+<p:sld xmlns:a="http://schemas.openxmlformats.org/drawingml/2006/main" xmlns:r="http://schemas.openxmlformats.org/officeDocument/2006/relationships" xmlns:p="http://schemas.openxmlformats.org/presentationml/2006/main">
+  <p:cSld>
+    <p:spTree>
+      <p:nvGrpSpPr>
+        <p:cNvPr id="1" name=""/>
+        <p:cNvGrpSpPr/>
+        <p:nvPr/>
+      </p:nvGrpSpPr>
+      <p:grpSpPr/>
+      <p:sp>
+        <p:nvSpPr>
+          <p:cNvPr id="4" name="Slide Number Placeholder 3"/>
+          <p:cNvSpPr>
+            <a:spLocks noGrp="1"/>
+          </p:cNvSpPr>
+          <p:nvPr>
+            <p:ph type="sldNum" sz="quarter" idx="7"/>
+          </p:nvPr>
+        </p:nvSpPr>
+        <p:spPr/>
+        <p:txBody>
+          <a:bodyPr/>
+          <a:p>
+            <a:fld id="{B6F15528-21DE-4FAA-801E-634DDDAF4B2B}" type="slidenum">
+              <a:rPr/>
+            </a:fld>
+            <a:endParaRPr/>
+          </a:p>
+        </p:txBody>
+      </p:sp>
+      <p:pic>
+        <p:nvPicPr>
+          <p:cNvPr id="5" name="Content Placeholder 4"/>
+          <p:cNvPicPr>
+            <a:picLocks noChangeAspect="1"/>
+          </p:cNvPicPr>
+          <p:nvPr>
+            <p:ph sz="half" idx="2"/>
+          </p:nvPr>
+        </p:nvPicPr>
+        <p:blipFill>
+          <a:blip r:embed="rId1"/>
+          <a:stretch>
+            <a:fillRect/>
+          </a:stretch>
+        </p:blipFill>
+        <p:spPr>
+          <a:xfrm>
+            <a:off x="2279650" y="459740"/>
+            <a:ext cx="16315055" cy="10389870"/>
+          </a:xfrm>
+          <a:prstGeom prst="rect">
+            <a:avLst/>
+          </a:prstGeom>
+        </p:spPr>
+      </p:pic>
+    </p:spTree>
+  </p:cSld>
+  <p:clrMapOvr>
+    <a:masterClrMapping/>
+  </p:clrMapOvr>
+</p:sld>
+</file>
+
+<file path=ppt/slides/slide9.xml><?xml version="1.0" encoding="utf-8"?>
 <p:sld xmlns:a="http://schemas.openxmlformats.org/drawingml/2006/main" xmlns:r="http://schemas.openxmlformats.org/officeDocument/2006/relationships" xmlns:p="http://schemas.openxmlformats.org/presentationml/2006/main" showMasterSp="0">
   <p:cSld>
     <p:spTree>
@@ -5447,8 +5142,8 @@
         </p:nvSpPr>
         <p:spPr>
           <a:xfrm>
-            <a:off x="5899664" y="795651"/>
-            <a:ext cx="8305165" cy="930275"/>
+            <a:off x="7597832" y="795651"/>
+            <a:ext cx="4908550" cy="930275"/>
           </a:xfrm>
           <a:prstGeom prst="rect">
             <a:avLst/>
@@ -5469,14 +5164,34 @@
               </a:spcBef>
             </a:pPr>
             <a:r>
-              <a:rPr sz="5900" spc="25" dirty="0">
+              <a:rPr sz="5900" spc="-385" dirty="0">
                 <a:solidFill>
                   <a:srgbClr val="404040"/>
                 </a:solidFill>
                 <a:latin typeface="Verdana" panose="020B0604030504040204"/>
                 <a:cs typeface="Verdana" panose="020B0604030504040204"/>
               </a:rPr>
-              <a:t>EntityManagerFactory</a:t>
+              <a:t>T</a:t>
+            </a:r>
+            <a:r>
+              <a:rPr sz="5900" spc="-295" dirty="0">
+                <a:solidFill>
+                  <a:srgbClr val="404040"/>
+                </a:solidFill>
+                <a:latin typeface="Verdana" panose="020B0604030504040204"/>
+                <a:cs typeface="Verdana" panose="020B0604030504040204"/>
+              </a:rPr>
+              <a:t>r</a:t>
+            </a:r>
+            <a:r>
+              <a:rPr sz="5900" spc="-40" dirty="0">
+                <a:solidFill>
+                  <a:srgbClr val="404040"/>
+                </a:solidFill>
+                <a:latin typeface="Verdana" panose="020B0604030504040204"/>
+                <a:cs typeface="Verdana" panose="020B0604030504040204"/>
+              </a:rPr>
+              <a:t>ansactional</a:t>
             </a:r>
             <a:endParaRPr sz="5900">
               <a:latin typeface="Verdana" panose="020B0604030504040204"/>
@@ -5493,124 +5208,33 @@
         </p:nvSpPr>
         <p:spPr>
           <a:xfrm>
-            <a:off x="1227702" y="2333156"/>
-            <a:ext cx="14010640" cy="7685405"/>
+            <a:off x="1147710" y="4301440"/>
+            <a:ext cx="13219430" cy="2538730"/>
           </a:xfrm>
           <a:prstGeom prst="rect">
             <a:avLst/>
           </a:prstGeom>
         </p:spPr>
         <p:txBody>
-          <a:bodyPr vert="horz" wrap="square" lIns="0" tIns="12065" rIns="0" bIns="0" rtlCol="0">
+          <a:bodyPr vert="horz" wrap="square" lIns="0" tIns="114935" rIns="0" bIns="0" rtlCol="0">
             <a:spAutoFit/>
           </a:bodyPr>
           <a:lstStyle/>
           <a:p>
-            <a:pPr marL="12700" marR="1322070">
+            <a:pPr marL="12700">
               <a:lnSpc>
-                <a:spcPct val="120000"/>
+                <a:spcPct val="100000"/>
               </a:lnSpc>
               <a:spcBef>
-                <a:spcPts val="95"/>
+                <a:spcPts val="905"/>
               </a:spcBef>
             </a:pPr>
             <a:r>
-              <a:rPr sz="3450" dirty="0">
-                <a:latin typeface="Courier New" panose="02070309020205020404"/>
-                <a:cs typeface="Courier New" panose="02070309020205020404"/>
-              </a:rPr>
-              <a:t>EntityManagerFactory</a:t>
-            </a:r>
-            <a:r>
               <a:rPr sz="3450" spc="5" dirty="0">
                 <a:latin typeface="Courier New" panose="02070309020205020404"/>
                 <a:cs typeface="Courier New" panose="02070309020205020404"/>
               </a:rPr>
-              <a:t> </a:t>
-            </a:r>
-            <a:r>
-              <a:rPr sz="3450" dirty="0">
-                <a:latin typeface="Courier New" panose="02070309020205020404"/>
-                <a:cs typeface="Courier New" panose="02070309020205020404"/>
-              </a:rPr>
-              <a:t>entityManagerFactory</a:t>
-            </a:r>
-            <a:r>
-              <a:rPr sz="3450" spc="10" dirty="0">
-                <a:latin typeface="Courier New" panose="02070309020205020404"/>
-                <a:cs typeface="Courier New" panose="02070309020205020404"/>
-              </a:rPr>
-              <a:t> </a:t>
-            </a:r>
-            <a:r>
-              <a:rPr sz="3450" spc="5" dirty="0">
-                <a:latin typeface="Courier New" panose="02070309020205020404"/>
-                <a:cs typeface="Courier New" panose="02070309020205020404"/>
-              </a:rPr>
-              <a:t>= </a:t>
-            </a:r>
-            <a:r>
-              <a:rPr sz="3450" spc="10" dirty="0">
-                <a:latin typeface="Courier New" panose="02070309020205020404"/>
-                <a:cs typeface="Courier New" panose="02070309020205020404"/>
-              </a:rPr>
-              <a:t> </a:t>
-            </a:r>
-            <a:r>
-              <a:rPr sz="3450" spc="5" dirty="0">
-                <a:latin typeface="Courier New" panose="02070309020205020404"/>
-                <a:cs typeface="Courier New" panose="02070309020205020404"/>
-              </a:rPr>
-              <a:t>Persistence.createEntityManagerFactory("PUNIT"); </a:t>
-            </a:r>
-            <a:r>
-              <a:rPr sz="3450" spc="-2060" dirty="0">
-                <a:latin typeface="Courier New" panose="02070309020205020404"/>
-                <a:cs typeface="Courier New" panose="02070309020205020404"/>
-              </a:rPr>
-              <a:t> </a:t>
-            </a:r>
-            <a:r>
-              <a:rPr sz="3450" dirty="0">
-                <a:latin typeface="Courier New" panose="02070309020205020404"/>
-                <a:cs typeface="Courier New" panose="02070309020205020404"/>
-              </a:rPr>
-              <a:t>EntityManager entityManager</a:t>
-            </a:r>
-            <a:r>
-              <a:rPr sz="3450" spc="5" dirty="0">
-                <a:latin typeface="Courier New" panose="02070309020205020404"/>
-                <a:cs typeface="Courier New" panose="02070309020205020404"/>
-              </a:rPr>
-              <a:t> = </a:t>
-            </a:r>
-            <a:r>
-              <a:rPr sz="3450" spc="10" dirty="0">
-                <a:latin typeface="Courier New" panose="02070309020205020404"/>
-                <a:cs typeface="Courier New" panose="02070309020205020404"/>
-              </a:rPr>
-              <a:t> </a:t>
-            </a:r>
-            <a:r>
-              <a:rPr sz="3450" spc="5" dirty="0">
-                <a:latin typeface="Courier New" panose="02070309020205020404"/>
-                <a:cs typeface="Courier New" panose="02070309020205020404"/>
-              </a:rPr>
-              <a:t>entityManagerFactory.createEntityManager(); </a:t>
-            </a:r>
-            <a:r>
-              <a:rPr sz="3450" spc="10" dirty="0">
-                <a:latin typeface="Courier New" panose="02070309020205020404"/>
-                <a:cs typeface="Courier New" panose="02070309020205020404"/>
-              </a:rPr>
-              <a:t> </a:t>
-            </a:r>
-            <a:r>
-              <a:rPr sz="3450" spc="5" dirty="0">
-                <a:latin typeface="Courier New" panose="02070309020205020404"/>
-                <a:cs typeface="Courier New" panose="02070309020205020404"/>
-              </a:rPr>
-              <a:t>entityManager.getTransaction().begin();</a:t>
+              <a:t>@Transactional</a:t>
             </a:r>
             <a:endParaRPr sz="3450">
               <a:latin typeface="Courier New" panose="02070309020205020404"/>
@@ -5618,21 +5242,7 @@
             </a:endParaRPr>
           </a:p>
           <a:p>
-            <a:pPr>
-              <a:lnSpc>
-                <a:spcPct val="100000"/>
-              </a:lnSpc>
-              <a:spcBef>
-                <a:spcPts val="20"/>
-              </a:spcBef>
-            </a:pPr>
-            <a:endParaRPr sz="4350">
-              <a:latin typeface="Courier New" panose="02070309020205020404"/>
-              <a:cs typeface="Courier New" panose="02070309020205020404"/>
-            </a:endParaRPr>
-          </a:p>
-          <a:p>
-            <a:pPr marL="12700" marR="5080">
+            <a:pPr marL="1068070" marR="5080" indent="-1056005">
               <a:lnSpc>
                 <a:spcPct val="120000"/>
               </a:lnSpc>
@@ -5642,10 +5252,10 @@
                 <a:latin typeface="Courier New" panose="02070309020205020404"/>
                 <a:cs typeface="Courier New" panose="02070309020205020404"/>
               </a:rPr>
-              <a:t>Registration</a:t>
-            </a:r>
-            <a:r>
-              <a:rPr sz="3450" spc="10" dirty="0">
+              <a:t>public</a:t>
+            </a:r>
+            <a:r>
+              <a:rPr sz="3450" spc="15" dirty="0">
                 <a:latin typeface="Courier New" panose="02070309020205020404"/>
                 <a:cs typeface="Courier New" panose="02070309020205020404"/>
               </a:rPr>
@@ -5656,7 +5266,7 @@
                 <a:latin typeface="Courier New" panose="02070309020205020404"/>
                 <a:cs typeface="Courier New" panose="02070309020205020404"/>
               </a:rPr>
-              <a:t>reg</a:t>
+              <a:t>void</a:t>
             </a:r>
             <a:r>
               <a:rPr sz="3450" spc="15" dirty="0">
@@ -5666,126 +5276,53 @@
               <a:t> </a:t>
             </a:r>
             <a:r>
+              <a:rPr sz="3450" dirty="0">
+                <a:latin typeface="Courier New" panose="02070309020205020404"/>
+                <a:cs typeface="Courier New" panose="02070309020205020404"/>
+              </a:rPr>
+              <a:t>createRegistration(Registration</a:t>
+            </a:r>
+            <a:r>
+              <a:rPr sz="3450" spc="15" dirty="0">
+                <a:latin typeface="Courier New" panose="02070309020205020404"/>
+                <a:cs typeface="Courier New" panose="02070309020205020404"/>
+              </a:rPr>
+              <a:t> </a:t>
+            </a:r>
+            <a:r>
+              <a:rPr sz="3450" dirty="0">
+                <a:latin typeface="Courier New" panose="02070309020205020404"/>
+                <a:cs typeface="Courier New" panose="02070309020205020404"/>
+              </a:rPr>
+              <a:t>reg)</a:t>
+            </a:r>
+            <a:r>
+              <a:rPr sz="3450" spc="15" dirty="0">
+                <a:latin typeface="Courier New" panose="02070309020205020404"/>
+                <a:cs typeface="Courier New" panose="02070309020205020404"/>
+              </a:rPr>
+              <a:t> </a:t>
+            </a:r>
+            <a:r>
               <a:rPr sz="3450" spc="5" dirty="0">
                 <a:latin typeface="Courier New" panose="02070309020205020404"/>
                 <a:cs typeface="Courier New" panose="02070309020205020404"/>
               </a:rPr>
-              <a:t>=</a:t>
-            </a:r>
-            <a:r>
-              <a:rPr sz="3450" spc="15" dirty="0">
+              <a:t>{ </a:t>
+            </a:r>
+            <a:r>
+              <a:rPr sz="3450" spc="-2055" dirty="0">
                 <a:latin typeface="Courier New" panose="02070309020205020404"/>
                 <a:cs typeface="Courier New" panose="02070309020205020404"/>
               </a:rPr>
               <a:t> </a:t>
             </a:r>
             <a:r>
-              <a:rPr sz="3450" dirty="0">
-                <a:latin typeface="Courier New" panose="02070309020205020404"/>
-                <a:cs typeface="Courier New" panose="02070309020205020404"/>
-              </a:rPr>
-              <a:t>new</a:t>
-            </a:r>
-            <a:r>
-              <a:rPr sz="3450" spc="15" dirty="0">
-                <a:latin typeface="Courier New" panose="02070309020205020404"/>
-                <a:cs typeface="Courier New" panose="02070309020205020404"/>
-              </a:rPr>
-              <a:t> </a:t>
-            </a:r>
-            <a:r>
-              <a:rPr sz="3450" dirty="0">
-                <a:latin typeface="Courier New" panose="02070309020205020404"/>
-                <a:cs typeface="Courier New" panose="02070309020205020404"/>
-              </a:rPr>
-              <a:t>Registration("Bob",</a:t>
-            </a:r>
-            <a:r>
-              <a:rPr sz="3450" spc="15" dirty="0">
-                <a:latin typeface="Courier New" panose="02070309020205020404"/>
-                <a:cs typeface="Courier New" panose="02070309020205020404"/>
-              </a:rPr>
-              <a:t> </a:t>
-            </a:r>
-            <a:r>
-              <a:rPr sz="3450" dirty="0">
-                <a:latin typeface="Courier New" panose="02070309020205020404"/>
-                <a:cs typeface="Courier New" panose="02070309020205020404"/>
-              </a:rPr>
-              <a:t>"Builder", </a:t>
-            </a:r>
-            <a:r>
-              <a:rPr sz="3450" spc="-2055" dirty="0">
-                <a:latin typeface="Courier New" panose="02070309020205020404"/>
-                <a:cs typeface="Courier New" panose="02070309020205020404"/>
-              </a:rPr>
-              <a:t> </a:t>
-            </a:r>
-            <a:r>
               <a:rPr sz="3450" spc="5" dirty="0">
                 <a:latin typeface="Courier New" panose="02070309020205020404"/>
                 <a:cs typeface="Courier New" panose="02070309020205020404"/>
-                <a:hlinkClick r:id="rId1"/>
-              </a:rPr>
-              <a:t>"bobthebuilder@</a:t>
-            </a:r>
-            <a:r>
-              <a:rPr lang="en-US" sz="3450" spc="5" dirty="0">
-                <a:latin typeface="Courier New" panose="02070309020205020404"/>
-                <a:cs typeface="Courier New" panose="02070309020205020404"/>
-                <a:hlinkClick r:id="rId1"/>
-              </a:rPr>
-              <a:t>mycompany</a:t>
-            </a:r>
-            <a:r>
-              <a:rPr sz="3450" spc="5" dirty="0">
-                <a:latin typeface="Courier New" panose="02070309020205020404"/>
-                <a:cs typeface="Courier New" panose="02070309020205020404"/>
-                <a:hlinkClick r:id="rId1"/>
-              </a:rPr>
-              <a:t>.com"); </a:t>
-            </a:r>
-            <a:r>
-              <a:rPr sz="3450" spc="10" dirty="0">
-                <a:latin typeface="Courier New" panose="02070309020205020404"/>
-                <a:cs typeface="Courier New" panose="02070309020205020404"/>
-              </a:rPr>
-              <a:t> </a:t>
-            </a:r>
-            <a:r>
-              <a:rPr sz="3450" spc="5" dirty="0">
-                <a:latin typeface="Courier New" panose="02070309020205020404"/>
-                <a:cs typeface="Courier New" panose="02070309020205020404"/>
-              </a:rPr>
-              <a:t>entityManager.persist(reg); </a:t>
-            </a:r>
-            <a:r>
-              <a:rPr sz="3450" spc="10" dirty="0">
-                <a:latin typeface="Courier New" panose="02070309020205020404"/>
-                <a:cs typeface="Courier New" panose="02070309020205020404"/>
-              </a:rPr>
-              <a:t> </a:t>
-            </a:r>
-            <a:r>
-              <a:rPr sz="3450" spc="5" dirty="0">
-                <a:latin typeface="Courier New" panose="02070309020205020404"/>
-                <a:cs typeface="Courier New" panose="02070309020205020404"/>
-              </a:rPr>
-              <a:t>entityManager.getTransaction().commit(); </a:t>
-            </a:r>
-            <a:r>
-              <a:rPr sz="3450" spc="10" dirty="0">
-                <a:latin typeface="Courier New" panose="02070309020205020404"/>
-                <a:cs typeface="Courier New" panose="02070309020205020404"/>
-              </a:rPr>
-              <a:t> </a:t>
-            </a:r>
-            <a:r>
-              <a:rPr sz="3450" spc="5" dirty="0">
-                <a:latin typeface="Courier New" panose="02070309020205020404"/>
-                <a:cs typeface="Courier New" panose="02070309020205020404"/>
-              </a:rPr>
-              <a:t>entityManager.close();</a:t>
+              </a:rPr>
+              <a:t>registrationRepository.save(reg);</a:t>
             </a:r>
             <a:endParaRPr sz="3450">
               <a:latin typeface="Courier New" panose="02070309020205020404"/>
@@ -5806,360 +5343,11 @@
                 <a:latin typeface="Courier New" panose="02070309020205020404"/>
                 <a:cs typeface="Courier New" panose="02070309020205020404"/>
               </a:rPr>
-              <a:t>entityManagerFactory.close();</a:t>
+              <a:t>}</a:t>
             </a:r>
             <a:endParaRPr sz="3450">
               <a:latin typeface="Courier New" panose="02070309020205020404"/>
               <a:cs typeface="Courier New" panose="02070309020205020404"/>
-            </a:endParaRPr>
-          </a:p>
-        </p:txBody>
-      </p:sp>
-      <p:sp>
-        <p:nvSpPr>
-          <p:cNvPr id="5" name="Slide Number Placeholder 4"/>
-          <p:cNvSpPr>
-            <a:spLocks noGrp="1"/>
-          </p:cNvSpPr>
-          <p:nvPr>
-            <p:ph type="sldNum" sz="quarter" idx="7"/>
-          </p:nvPr>
-        </p:nvSpPr>
-        <p:spPr/>
-        <p:txBody>
-          <a:bodyPr/>
-          <a:p>
-            <a:fld id="{B6F15528-21DE-4FAA-801E-634DDDAF4B2B}" type="slidenum">
-              <a:rPr/>
-            </a:fld>
-            <a:endParaRPr/>
-          </a:p>
-        </p:txBody>
-      </p:sp>
-    </p:spTree>
-  </p:cSld>
-  <p:clrMapOvr>
-    <a:masterClrMapping/>
-  </p:clrMapOvr>
-</p:sld>
-</file>
-
-<file path=ppt/slides/slide9.xml><?xml version="1.0" encoding="utf-8"?>
-<p:sld xmlns:a="http://schemas.openxmlformats.org/drawingml/2006/main" xmlns:r="http://schemas.openxmlformats.org/officeDocument/2006/relationships" xmlns:p="http://schemas.openxmlformats.org/presentationml/2006/main" showMasterSp="0">
-  <p:cSld>
-    <p:spTree>
-      <p:nvGrpSpPr>
-        <p:cNvPr id="1" name=""/>
-        <p:cNvGrpSpPr/>
-        <p:nvPr/>
-      </p:nvGrpSpPr>
-      <p:grpSpPr>
-        <a:xfrm>
-          <a:off x="0" y="0"/>
-          <a:ext cx="0" cy="0"/>
-          <a:chOff x="0" y="0"/>
-          <a:chExt cx="0" cy="0"/>
-        </a:xfrm>
-      </p:grpSpPr>
-      <p:sp>
-        <p:nvSpPr>
-          <p:cNvPr id="2" name="object 2"/>
-          <p:cNvSpPr/>
-          <p:nvPr/>
-        </p:nvSpPr>
-        <p:spPr>
-          <a:xfrm>
-            <a:off x="597688" y="6340484"/>
-            <a:ext cx="18664555" cy="6985"/>
-          </a:xfrm>
-          <a:custGeom>
-            <a:avLst/>
-            <a:gdLst/>
-            <a:ahLst/>
-            <a:cxnLst/>
-            <a:rect l="l" t="t" r="r" b="b"/>
-            <a:pathLst>
-              <a:path w="18664555" h="6985">
-                <a:moveTo>
-                  <a:pt x="18664217" y="0"/>
-                </a:moveTo>
-                <a:lnTo>
-                  <a:pt x="0" y="6789"/>
-                </a:lnTo>
-              </a:path>
-            </a:pathLst>
-          </a:custGeom>
-          <a:ln w="31412">
-            <a:solidFill>
-              <a:srgbClr val="E5E5E5"/>
-            </a:solidFill>
-          </a:ln>
-        </p:spPr>
-        <p:txBody>
-          <a:bodyPr wrap="square" lIns="0" tIns="0" rIns="0" bIns="0" rtlCol="0"/>
-          <a:lstStyle/>
-          <a:p/>
-        </p:txBody>
-      </p:sp>
-      <p:sp>
-        <p:nvSpPr>
-          <p:cNvPr id="3" name="object 3"/>
-          <p:cNvSpPr txBox="1">
-            <a:spLocks noGrp="1"/>
-          </p:cNvSpPr>
-          <p:nvPr>
-            <p:ph type="title"/>
-          </p:nvPr>
-        </p:nvSpPr>
-        <p:spPr>
-          <a:prstGeom prst="rect">
-            <a:avLst/>
-          </a:prstGeom>
-        </p:spPr>
-        <p:txBody>
-          <a:bodyPr vert="horz" wrap="square" lIns="0" tIns="13335" rIns="0" bIns="0" rtlCol="0">
-            <a:spAutoFit/>
-          </a:bodyPr>
-          <a:lstStyle/>
-          <a:p>
-            <a:pPr marL="12700">
-              <a:lnSpc>
-                <a:spcPct val="100000"/>
-              </a:lnSpc>
-              <a:spcBef>
-                <a:spcPts val="105"/>
-              </a:spcBef>
-            </a:pPr>
-            <a:r>
-              <a:rPr dirty="0"/>
-              <a:t>&lt;dependency&gt;</a:t>
-            </a:r>
-            <a:endParaRPr dirty="0"/>
-          </a:p>
-        </p:txBody>
-      </p:sp>
-      <p:sp>
-        <p:nvSpPr>
-          <p:cNvPr id="4" name="object 4"/>
-          <p:cNvSpPr txBox="1">
-            <a:spLocks noGrp="1"/>
-          </p:cNvSpPr>
-          <p:nvPr>
-            <p:ph type="body" idx="1"/>
-          </p:nvPr>
-        </p:nvSpPr>
-        <p:spPr>
-          <a:prstGeom prst="rect">
-            <a:avLst/>
-          </a:prstGeom>
-        </p:spPr>
-        <p:txBody>
-          <a:bodyPr vert="horz" wrap="square" lIns="0" tIns="13335" rIns="0" bIns="0" rtlCol="0">
-            <a:spAutoFit/>
-          </a:bodyPr>
-          <a:lstStyle/>
-          <a:p>
-            <a:pPr marL="1591310">
-              <a:lnSpc>
-                <a:spcPct val="100000"/>
-              </a:lnSpc>
-              <a:spcBef>
-                <a:spcPts val="105"/>
-              </a:spcBef>
-            </a:pPr>
-            <a:r>
-              <a:rPr spc="-5" dirty="0"/>
-              <a:t>&lt;groupId&gt;mysql&lt;/groupId&gt;</a:t>
-            </a:r>
-            <a:endParaRPr spc="-5" dirty="0"/>
-          </a:p>
-          <a:p>
-            <a:pPr marL="1591310">
-              <a:lnSpc>
-                <a:spcPct val="100000"/>
-              </a:lnSpc>
-              <a:spcBef>
-                <a:spcPts val="210"/>
-              </a:spcBef>
-            </a:pPr>
-            <a:r>
-              <a:rPr dirty="0"/>
-              <a:t>&lt;artifactId&gt;mysql-connector-java&lt;/artifactId&gt;</a:t>
-            </a:r>
-            <a:endParaRPr dirty="0"/>
-          </a:p>
-          <a:p>
-            <a:pPr marL="83820">
-              <a:lnSpc>
-                <a:spcPct val="100000"/>
-              </a:lnSpc>
-              <a:spcBef>
-                <a:spcPts val="205"/>
-              </a:spcBef>
-            </a:pPr>
-            <a:r>
-              <a:rPr dirty="0"/>
-              <a:t>&lt;/dependency&gt;</a:t>
-            </a:r>
-            <a:endParaRPr dirty="0"/>
-          </a:p>
-          <a:p>
-            <a:pPr>
-              <a:lnSpc>
-                <a:spcPct val="100000"/>
-              </a:lnSpc>
-            </a:pPr>
-            <a:endParaRPr sz="5200"/>
-          </a:p>
-          <a:p>
-            <a:pPr>
-              <a:lnSpc>
-                <a:spcPct val="100000"/>
-              </a:lnSpc>
-              <a:spcBef>
-                <a:spcPts val="10"/>
-              </a:spcBef>
-            </a:pPr>
-            <a:endParaRPr sz="4950"/>
-          </a:p>
-          <a:p>
-            <a:pPr marL="12700">
-              <a:lnSpc>
-                <a:spcPct val="100000"/>
-              </a:lnSpc>
-              <a:spcBef>
-                <a:spcPts val="5"/>
-              </a:spcBef>
-            </a:pPr>
-            <a:r>
-              <a:rPr sz="5900" spc="165" dirty="0">
-                <a:solidFill>
-                  <a:srgbClr val="404040"/>
-                </a:solidFill>
-                <a:latin typeface="Verdana" panose="020B0604030504040204"/>
-                <a:cs typeface="Verdana" panose="020B0604030504040204"/>
-              </a:rPr>
-              <a:t>Adding</a:t>
-            </a:r>
-            <a:r>
-              <a:rPr sz="5900" spc="-305" dirty="0">
-                <a:solidFill>
-                  <a:srgbClr val="404040"/>
-                </a:solidFill>
-                <a:latin typeface="Verdana" panose="020B0604030504040204"/>
-                <a:cs typeface="Verdana" panose="020B0604030504040204"/>
-              </a:rPr>
-              <a:t> </a:t>
-            </a:r>
-            <a:r>
-              <a:rPr sz="5900" spc="145" dirty="0">
-                <a:solidFill>
-                  <a:srgbClr val="404040"/>
-                </a:solidFill>
-                <a:latin typeface="Verdana" panose="020B0604030504040204"/>
-                <a:cs typeface="Verdana" panose="020B0604030504040204"/>
-              </a:rPr>
-              <a:t>MySQL</a:t>
-            </a:r>
-            <a:r>
-              <a:rPr sz="5900" spc="-305" dirty="0">
-                <a:solidFill>
-                  <a:srgbClr val="404040"/>
-                </a:solidFill>
-                <a:latin typeface="Verdana" panose="020B0604030504040204"/>
-                <a:cs typeface="Verdana" panose="020B0604030504040204"/>
-              </a:rPr>
-              <a:t> </a:t>
-            </a:r>
-            <a:r>
-              <a:rPr sz="5900" spc="-90" dirty="0">
-                <a:solidFill>
-                  <a:srgbClr val="404040"/>
-                </a:solidFill>
-                <a:latin typeface="Verdana" panose="020B0604030504040204"/>
-                <a:cs typeface="Verdana" panose="020B0604030504040204"/>
-              </a:rPr>
-              <a:t>Maven</a:t>
-            </a:r>
-            <a:r>
-              <a:rPr sz="5900" spc="-305" dirty="0">
-                <a:solidFill>
-                  <a:srgbClr val="404040"/>
-                </a:solidFill>
-                <a:latin typeface="Verdana" panose="020B0604030504040204"/>
-                <a:cs typeface="Verdana" panose="020B0604030504040204"/>
-              </a:rPr>
-              <a:t> </a:t>
-            </a:r>
-            <a:r>
-              <a:rPr sz="5900" spc="50" dirty="0">
-                <a:solidFill>
-                  <a:srgbClr val="404040"/>
-                </a:solidFill>
-                <a:latin typeface="Verdana" panose="020B0604030504040204"/>
-                <a:cs typeface="Verdana" panose="020B0604030504040204"/>
-              </a:rPr>
-              <a:t>Dependency</a:t>
-            </a:r>
-            <a:endParaRPr sz="5900">
-              <a:latin typeface="Verdana" panose="020B0604030504040204"/>
-              <a:cs typeface="Verdana" panose="020B0604030504040204"/>
-            </a:endParaRPr>
-          </a:p>
-          <a:p>
-            <a:pPr marL="48895">
-              <a:lnSpc>
-                <a:spcPct val="100000"/>
-              </a:lnSpc>
-              <a:spcBef>
-                <a:spcPts val="1130"/>
-              </a:spcBef>
-            </a:pPr>
-            <a:r>
-              <a:rPr sz="3100" spc="25" dirty="0">
-                <a:latin typeface="Verdana" panose="020B0604030504040204"/>
-                <a:cs typeface="Verdana" panose="020B0604030504040204"/>
-              </a:rPr>
-              <a:t>Version</a:t>
-            </a:r>
-            <a:endParaRPr sz="3100">
-              <a:latin typeface="Verdana" panose="020B0604030504040204"/>
-              <a:cs typeface="Verdana" panose="020B0604030504040204"/>
-            </a:endParaRPr>
-          </a:p>
-          <a:p>
-            <a:pPr marL="48895">
-              <a:lnSpc>
-                <a:spcPct val="100000"/>
-              </a:lnSpc>
-              <a:spcBef>
-                <a:spcPts val="3040"/>
-              </a:spcBef>
-            </a:pPr>
-            <a:r>
-              <a:rPr sz="3100" spc="-20" dirty="0">
-                <a:latin typeface="Verdana" panose="020B0604030504040204"/>
-                <a:cs typeface="Verdana" panose="020B0604030504040204"/>
-              </a:rPr>
-              <a:t>Transitive</a:t>
-            </a:r>
-            <a:r>
-              <a:rPr sz="3100" spc="-165" dirty="0">
-                <a:latin typeface="Verdana" panose="020B0604030504040204"/>
-                <a:cs typeface="Verdana" panose="020B0604030504040204"/>
-              </a:rPr>
-              <a:t> </a:t>
-            </a:r>
-            <a:r>
-              <a:rPr sz="3100" spc="55" dirty="0">
-                <a:latin typeface="Verdana" panose="020B0604030504040204"/>
-                <a:cs typeface="Verdana" panose="020B0604030504040204"/>
-              </a:rPr>
-              <a:t>Dependencies</a:t>
-            </a:r>
-            <a:endParaRPr sz="3100">
-              <a:latin typeface="Verdana" panose="020B0604030504040204"/>
-              <a:cs typeface="Verdana" panose="020B0604030504040204"/>
             </a:endParaRPr>
           </a:p>
         </p:txBody>
@@ -6736,4 +5924,263 @@
     </a:ext>
   </a:extLst>
 </a:theme>
+</file>
+
+<file path=ppt/theme/theme3.xml><?xml version="1.0" encoding="utf-8"?>
+<a:theme xmlns:a="http://schemas.openxmlformats.org/drawingml/2006/main" name="Office Theme">
+  <a:themeElements>
+    <a:clrScheme name="Office">
+      <a:dk1>
+        <a:sysClr val="windowText" lastClr="000000"/>
+      </a:dk1>
+      <a:lt1>
+        <a:sysClr val="window" lastClr="FFFFFF"/>
+      </a:lt1>
+      <a:dk2>
+        <a:srgbClr val="44546A"/>
+      </a:dk2>
+      <a:lt2>
+        <a:srgbClr val="E7E6E6"/>
+      </a:lt2>
+      <a:accent1>
+        <a:srgbClr val="5B9BD5"/>
+      </a:accent1>
+      <a:accent2>
+        <a:srgbClr val="ED7D31"/>
+      </a:accent2>
+      <a:accent3>
+        <a:srgbClr val="A5A5A5"/>
+      </a:accent3>
+      <a:accent4>
+        <a:srgbClr val="FFC000"/>
+      </a:accent4>
+      <a:accent5>
+        <a:srgbClr val="4472C4"/>
+      </a:accent5>
+      <a:accent6>
+        <a:srgbClr val="70AD47"/>
+      </a:accent6>
+      <a:hlink>
+        <a:srgbClr val="0563C1"/>
+      </a:hlink>
+      <a:folHlink>
+        <a:srgbClr val="954F72"/>
+      </a:folHlink>
+    </a:clrScheme>
+    <a:fontScheme name="Office">
+      <a:majorFont>
+        <a:latin typeface="Calibri Light"/>
+        <a:ea typeface=""/>
+        <a:cs typeface=""/>
+        <a:font script="Jpan" typeface="ＭＳ Ｐゴシック"/>
+        <a:font script="Hang" typeface="맑은 고딕"/>
+        <a:font script="Hans" typeface="宋体"/>
+        <a:font script="Hant" typeface="新細明體"/>
+        <a:font script="Arab" typeface="Times New Roman"/>
+        <a:font script="Hebr" typeface="Times New Roman"/>
+        <a:font script="Thai" typeface="Angsana New"/>
+        <a:font script="Ethi" typeface="Nyala"/>
+        <a:font script="Beng" typeface="Vrinda"/>
+        <a:font script="Gujr" typeface="Shruti"/>
+        <a:font script="Khmr" typeface="MoolBoran"/>
+        <a:font script="Knda" typeface="Tunga"/>
+        <a:font script="Guru" typeface="Raavi"/>
+        <a:font script="Cans" typeface="Euphemia"/>
+        <a:font script="Cher" typeface="Plantagenet Cherokee"/>
+        <a:font script="Yiii" typeface="Microsoft Yi Baiti"/>
+        <a:font script="Tibt" typeface="Microsoft Himalaya"/>
+        <a:font script="Thaa" typeface="MV Boli"/>
+        <a:font script="Deva" typeface="Mangal"/>
+        <a:font script="Telu" typeface="Gautami"/>
+        <a:font script="Taml" typeface="Latha"/>
+        <a:font script="Syrc" typeface="Estrangelo Edessa"/>
+        <a:font script="Orya" typeface="Kalinga"/>
+        <a:font script="Mlym" typeface="Kartika"/>
+        <a:font script="Laoo" typeface="DokChampa"/>
+        <a:font script="Sinh" typeface="Iskoola Pota"/>
+        <a:font script="Mong" typeface="Mongolian Baiti"/>
+        <a:font script="Viet" typeface="Times New Roman"/>
+        <a:font script="Uigh" typeface="Microsoft Uighur"/>
+        <a:font script="Geor" typeface="Sylfaen"/>
+      </a:majorFont>
+      <a:minorFont>
+        <a:latin typeface="Calibri"/>
+        <a:ea typeface=""/>
+        <a:cs typeface=""/>
+        <a:font script="Jpan" typeface="ＭＳ Ｐゴシック"/>
+        <a:font script="Hang" typeface="맑은 고딕"/>
+        <a:font script="Hans" typeface="宋体"/>
+        <a:font script="Hant" typeface="新細明體"/>
+        <a:font script="Arab" typeface="Arial"/>
+        <a:font script="Hebr" typeface="Arial"/>
+        <a:font script="Thai" typeface="Cordia New"/>
+        <a:font script="Ethi" typeface="Nyala"/>
+        <a:font script="Beng" typeface="Vrinda"/>
+        <a:font script="Gujr" typeface="Shruti"/>
+        <a:font script="Khmr" typeface="DaunPenh"/>
+        <a:font script="Knda" typeface="Tunga"/>
+        <a:font script="Guru" typeface="Raavi"/>
+        <a:font script="Cans" typeface="Euphemia"/>
+        <a:font script="Cher" typeface="Plantagenet Cherokee"/>
+        <a:font script="Yiii" typeface="Microsoft Yi Baiti"/>
+        <a:font script="Tibt" typeface="Microsoft Himalaya"/>
+        <a:font script="Thaa" typeface="MV Boli"/>
+        <a:font script="Deva" typeface="Mangal"/>
+        <a:font script="Telu" typeface="Gautami"/>
+        <a:font script="Taml" typeface="Latha"/>
+        <a:font script="Syrc" typeface="Estrangelo Edessa"/>
+        <a:font script="Orya" typeface="Kalinga"/>
+        <a:font script="Mlym" typeface="Kartika"/>
+        <a:font script="Laoo" typeface="DokChampa"/>
+        <a:font script="Sinh" typeface="Iskoola Pota"/>
+        <a:font script="Mong" typeface="Mongolian Baiti"/>
+        <a:font script="Viet" typeface="Arial"/>
+        <a:font script="Uigh" typeface="Microsoft Uighur"/>
+        <a:font script="Geor" typeface="Sylfaen"/>
+      </a:minorFont>
+    </a:fontScheme>
+    <a:fmtScheme name="Office">
+      <a:fillStyleLst>
+        <a:solidFill>
+          <a:schemeClr val="phClr"/>
+        </a:solidFill>
+        <a:gradFill rotWithShape="1">
+          <a:gsLst>
+            <a:gs pos="0">
+              <a:schemeClr val="phClr">
+                <a:lumMod val="110000"/>
+                <a:satMod val="105000"/>
+                <a:tint val="67000"/>
+              </a:schemeClr>
+            </a:gs>
+            <a:gs pos="50000">
+              <a:schemeClr val="phClr">
+                <a:lumMod val="105000"/>
+                <a:satMod val="103000"/>
+                <a:tint val="73000"/>
+              </a:schemeClr>
+            </a:gs>
+            <a:gs pos="100000">
+              <a:schemeClr val="phClr">
+                <a:lumMod val="105000"/>
+                <a:satMod val="109000"/>
+                <a:tint val="81000"/>
+              </a:schemeClr>
+            </a:gs>
+          </a:gsLst>
+          <a:lin ang="5400000" scaled="0"/>
+        </a:gradFill>
+        <a:gradFill rotWithShape="1">
+          <a:gsLst>
+            <a:gs pos="0">
+              <a:schemeClr val="phClr">
+                <a:satMod val="103000"/>
+                <a:lumMod val="102000"/>
+                <a:tint val="94000"/>
+              </a:schemeClr>
+            </a:gs>
+            <a:gs pos="50000">
+              <a:schemeClr val="phClr">
+                <a:satMod val="110000"/>
+                <a:lumMod val="100000"/>
+                <a:shade val="100000"/>
+              </a:schemeClr>
+            </a:gs>
+            <a:gs pos="100000">
+              <a:schemeClr val="phClr">
+                <a:lumMod val="99000"/>
+                <a:satMod val="120000"/>
+                <a:shade val="78000"/>
+              </a:schemeClr>
+            </a:gs>
+          </a:gsLst>
+          <a:lin ang="5400000" scaled="0"/>
+        </a:gradFill>
+      </a:fillStyleLst>
+      <a:lnStyleLst>
+        <a:ln w="6350" cap="flat" cmpd="sng" algn="ctr">
+          <a:solidFill>
+            <a:schemeClr val="phClr"/>
+          </a:solidFill>
+          <a:prstDash val="solid"/>
+          <a:miter lim="800000"/>
+        </a:ln>
+        <a:ln w="12700" cap="flat" cmpd="sng" algn="ctr">
+          <a:solidFill>
+            <a:schemeClr val="phClr"/>
+          </a:solidFill>
+          <a:prstDash val="solid"/>
+          <a:miter lim="800000"/>
+        </a:ln>
+        <a:ln w="19050" cap="flat" cmpd="sng" algn="ctr">
+          <a:solidFill>
+            <a:schemeClr val="phClr"/>
+          </a:solidFill>
+          <a:prstDash val="solid"/>
+          <a:miter lim="800000"/>
+        </a:ln>
+      </a:lnStyleLst>
+      <a:effectStyleLst>
+        <a:effectStyle>
+          <a:effectLst/>
+        </a:effectStyle>
+        <a:effectStyle>
+          <a:effectLst/>
+        </a:effectStyle>
+        <a:effectStyle>
+          <a:effectLst>
+            <a:outerShdw blurRad="57150" dist="19050" dir="5400000" algn="ctr" rotWithShape="0">
+              <a:srgbClr val="000000">
+                <a:alpha val="63000"/>
+              </a:srgbClr>
+            </a:outerShdw>
+          </a:effectLst>
+        </a:effectStyle>
+      </a:effectStyleLst>
+      <a:bgFillStyleLst>
+        <a:solidFill>
+          <a:schemeClr val="phClr"/>
+        </a:solidFill>
+        <a:solidFill>
+          <a:schemeClr val="phClr">
+            <a:tint val="95000"/>
+            <a:satMod val="170000"/>
+          </a:schemeClr>
+        </a:solidFill>
+        <a:gradFill rotWithShape="1">
+          <a:gsLst>
+            <a:gs pos="0">
+              <a:schemeClr val="phClr">
+                <a:tint val="93000"/>
+                <a:satMod val="150000"/>
+                <a:shade val="98000"/>
+                <a:lumMod val="102000"/>
+              </a:schemeClr>
+            </a:gs>
+            <a:gs pos="50000">
+              <a:schemeClr val="phClr">
+                <a:tint val="98000"/>
+                <a:satMod val="130000"/>
+                <a:shade val="90000"/>
+                <a:lumMod val="103000"/>
+              </a:schemeClr>
+            </a:gs>
+            <a:gs pos="100000">
+              <a:schemeClr val="phClr">
+                <a:shade val="63000"/>
+                <a:satMod val="120000"/>
+              </a:schemeClr>
+            </a:gs>
+          </a:gsLst>
+          <a:lin ang="5400000" scaled="0"/>
+        </a:gradFill>
+      </a:bgFillStyleLst>
+    </a:fmtScheme>
+  </a:themeElements>
+  <a:extLst>
+    <a:ext uri="{05A4C25C-085E-4340-85A3-A5531E510DB2}">
+      <thm15:themeFamily xmlns:thm15="http://schemas.microsoft.com/office/thememl/2012/main" name="Office Theme" id="{62F939B6-93AF-4DB8-9C6B-D6C7DFDC589F}" vid="{4A3C46E8-61CC-4603-A589-7422A47A8E4A}"/>
+    </a:ext>
+  </a:extLst>
+</a:theme>
 </file>
</xml_diff>